<commit_message>
reorganize DE vis pages and update overview figures
</commit_message>
<xml_diff>
--- a/assets/RNA-seq_Flowchart.pptx
+++ b/assets/RNA-seq_Flowchart.pptx
@@ -9,7 +9,8 @@
     <p:sldId id="256" r:id="rId3"/>
     <p:sldId id="258" r:id="rId4"/>
     <p:sldId id="257" r:id="rId5"/>
-    <p:sldId id="260" r:id="rId6"/>
+    <p:sldId id="262" r:id="rId6"/>
+    <p:sldId id="260" r:id="rId7"/>
   </p:sldIdLst>
   <p:sldSz cx="9144000" cy="6858000" type="screen4x3"/>
   <p:notesSz cx="6858000" cy="9144000"/>
@@ -108,6 +109,22 @@
       </a:defRPr>
     </a:lvl9pPr>
   </p:defaultTextStyle>
+  <p:extLst>
+    <p:ext uri="{EFAFB233-063F-42B5-8137-9DF3F51BA10A}">
+      <p15:sldGuideLst xmlns:p15="http://schemas.microsoft.com/office/powerpoint/2012/main">
+        <p15:guide id="1" orient="horz" pos="2160">
+          <p15:clr>
+            <a:srgbClr val="A4A3A4"/>
+          </p15:clr>
+        </p15:guide>
+        <p15:guide id="2" pos="2880">
+          <p15:clr>
+            <a:srgbClr val="A4A3A4"/>
+          </p15:clr>
+        </p15:guide>
+      </p15:sldGuideLst>
+    </p:ext>
+  </p:extLst>
 </p:presentation>
 </file>
 
@@ -149,10 +166,9 @@
           <a:lstStyle/>
           <a:p>
             <a:r>
-              <a:rPr lang="en-US" smtClean="0"/>
+              <a:rPr lang="en-US"/>
               <a:t>Click to edit Master title style</a:t>
             </a:r>
-            <a:endParaRPr lang="en-US"/>
           </a:p>
         </p:txBody>
       </p:sp>
@@ -268,10 +284,9 @@
           </a:lstStyle>
           <a:p>
             <a:r>
-              <a:rPr lang="en-US" smtClean="0"/>
+              <a:rPr lang="en-US"/>
               <a:t>Click to edit Master subtitle style</a:t>
             </a:r>
-            <a:endParaRPr lang="en-US"/>
           </a:p>
         </p:txBody>
       </p:sp>
@@ -292,7 +307,7 @@
           <a:p>
             <a:fld id="{BC7EBC0B-66B3-6748-B539-3251E59579B9}" type="datetimeFigureOut">
               <a:rPr lang="en-US" smtClean="0"/>
-              <a:t>11/14/18</a:t>
+              <a:t>4/25/24</a:t>
             </a:fld>
             <a:endParaRPr lang="en-US"/>
           </a:p>
@@ -386,10 +401,9 @@
           <a:lstStyle/>
           <a:p>
             <a:r>
-              <a:rPr lang="en-US" smtClean="0"/>
+              <a:rPr lang="en-US"/>
               <a:t>Click to edit Master title style</a:t>
             </a:r>
-            <a:endParaRPr lang="en-US"/>
           </a:p>
         </p:txBody>
       </p:sp>
@@ -410,38 +424,37 @@
           <a:p>
             <a:pPr lvl="0"/>
             <a:r>
-              <a:rPr lang="en-US" smtClean="0"/>
+              <a:rPr lang="en-US"/>
               <a:t>Click to edit Master text styles</a:t>
             </a:r>
           </a:p>
           <a:p>
             <a:pPr lvl="1"/>
             <a:r>
-              <a:rPr lang="en-US" smtClean="0"/>
+              <a:rPr lang="en-US"/>
               <a:t>Second level</a:t>
             </a:r>
           </a:p>
           <a:p>
             <a:pPr lvl="2"/>
             <a:r>
-              <a:rPr lang="en-US" smtClean="0"/>
+              <a:rPr lang="en-US"/>
               <a:t>Third level</a:t>
             </a:r>
           </a:p>
           <a:p>
             <a:pPr lvl="3"/>
             <a:r>
-              <a:rPr lang="en-US" smtClean="0"/>
+              <a:rPr lang="en-US"/>
               <a:t>Fourth level</a:t>
             </a:r>
           </a:p>
           <a:p>
             <a:pPr lvl="4"/>
             <a:r>
-              <a:rPr lang="en-US" smtClean="0"/>
+              <a:rPr lang="en-US"/>
               <a:t>Fifth level</a:t>
             </a:r>
-            <a:endParaRPr lang="en-US"/>
           </a:p>
         </p:txBody>
       </p:sp>
@@ -462,7 +475,7 @@
           <a:p>
             <a:fld id="{BC7EBC0B-66B3-6748-B539-3251E59579B9}" type="datetimeFigureOut">
               <a:rPr lang="en-US" smtClean="0"/>
-              <a:t>11/14/18</a:t>
+              <a:t>4/25/24</a:t>
             </a:fld>
             <a:endParaRPr lang="en-US"/>
           </a:p>
@@ -561,10 +574,9 @@
           <a:lstStyle/>
           <a:p>
             <a:r>
-              <a:rPr lang="en-US" smtClean="0"/>
+              <a:rPr lang="en-US"/>
               <a:t>Click to edit Master title style</a:t>
             </a:r>
-            <a:endParaRPr lang="en-US"/>
           </a:p>
         </p:txBody>
       </p:sp>
@@ -590,38 +602,37 @@
           <a:p>
             <a:pPr lvl="0"/>
             <a:r>
-              <a:rPr lang="en-US" smtClean="0"/>
+              <a:rPr lang="en-US"/>
               <a:t>Click to edit Master text styles</a:t>
             </a:r>
           </a:p>
           <a:p>
             <a:pPr lvl="1"/>
             <a:r>
-              <a:rPr lang="en-US" smtClean="0"/>
+              <a:rPr lang="en-US"/>
               <a:t>Second level</a:t>
             </a:r>
           </a:p>
           <a:p>
             <a:pPr lvl="2"/>
             <a:r>
-              <a:rPr lang="en-US" smtClean="0"/>
+              <a:rPr lang="en-US"/>
               <a:t>Third level</a:t>
             </a:r>
           </a:p>
           <a:p>
             <a:pPr lvl="3"/>
             <a:r>
-              <a:rPr lang="en-US" smtClean="0"/>
+              <a:rPr lang="en-US"/>
               <a:t>Fourth level</a:t>
             </a:r>
           </a:p>
           <a:p>
             <a:pPr lvl="4"/>
             <a:r>
-              <a:rPr lang="en-US" smtClean="0"/>
+              <a:rPr lang="en-US"/>
               <a:t>Fifth level</a:t>
             </a:r>
-            <a:endParaRPr lang="en-US"/>
           </a:p>
         </p:txBody>
       </p:sp>
@@ -642,7 +653,7 @@
           <a:p>
             <a:fld id="{BC7EBC0B-66B3-6748-B539-3251E59579B9}" type="datetimeFigureOut">
               <a:rPr lang="en-US" smtClean="0"/>
-              <a:t>11/14/18</a:t>
+              <a:t>4/25/24</a:t>
             </a:fld>
             <a:endParaRPr lang="en-US"/>
           </a:p>
@@ -736,10 +747,9 @@
           <a:lstStyle/>
           <a:p>
             <a:r>
-              <a:rPr lang="en-US" smtClean="0"/>
+              <a:rPr lang="en-US"/>
               <a:t>Click to edit Master title style</a:t>
             </a:r>
-            <a:endParaRPr lang="en-US"/>
           </a:p>
         </p:txBody>
       </p:sp>
@@ -760,38 +770,37 @@
           <a:p>
             <a:pPr lvl="0"/>
             <a:r>
-              <a:rPr lang="en-US" smtClean="0"/>
+              <a:rPr lang="en-US"/>
               <a:t>Click to edit Master text styles</a:t>
             </a:r>
           </a:p>
           <a:p>
             <a:pPr lvl="1"/>
             <a:r>
-              <a:rPr lang="en-US" smtClean="0"/>
+              <a:rPr lang="en-US"/>
               <a:t>Second level</a:t>
             </a:r>
           </a:p>
           <a:p>
             <a:pPr lvl="2"/>
             <a:r>
-              <a:rPr lang="en-US" smtClean="0"/>
+              <a:rPr lang="en-US"/>
               <a:t>Third level</a:t>
             </a:r>
           </a:p>
           <a:p>
             <a:pPr lvl="3"/>
             <a:r>
-              <a:rPr lang="en-US" smtClean="0"/>
+              <a:rPr lang="en-US"/>
               <a:t>Fourth level</a:t>
             </a:r>
           </a:p>
           <a:p>
             <a:pPr lvl="4"/>
             <a:r>
-              <a:rPr lang="en-US" smtClean="0"/>
+              <a:rPr lang="en-US"/>
               <a:t>Fifth level</a:t>
             </a:r>
-            <a:endParaRPr lang="en-US"/>
           </a:p>
         </p:txBody>
       </p:sp>
@@ -812,7 +821,7 @@
           <a:p>
             <a:fld id="{BC7EBC0B-66B3-6748-B539-3251E59579B9}" type="datetimeFigureOut">
               <a:rPr lang="en-US" smtClean="0"/>
-              <a:t>11/14/18</a:t>
+              <a:t>4/25/24</a:t>
             </a:fld>
             <a:endParaRPr lang="en-US"/>
           </a:p>
@@ -915,10 +924,9 @@
           </a:lstStyle>
           <a:p>
             <a:r>
-              <a:rPr lang="en-US" smtClean="0"/>
+              <a:rPr lang="en-US"/>
               <a:t>Click to edit Master title style</a:t>
             </a:r>
-            <a:endParaRPr lang="en-US"/>
           </a:p>
         </p:txBody>
       </p:sp>
@@ -1035,7 +1043,7 @@
           <a:p>
             <a:pPr lvl="0"/>
             <a:r>
-              <a:rPr lang="en-US" smtClean="0"/>
+              <a:rPr lang="en-US"/>
               <a:t>Click to edit Master text styles</a:t>
             </a:r>
           </a:p>
@@ -1058,7 +1066,7 @@
           <a:p>
             <a:fld id="{BC7EBC0B-66B3-6748-B539-3251E59579B9}" type="datetimeFigureOut">
               <a:rPr lang="en-US" smtClean="0"/>
-              <a:t>11/14/18</a:t>
+              <a:t>4/25/24</a:t>
             </a:fld>
             <a:endParaRPr lang="en-US"/>
           </a:p>
@@ -1152,10 +1160,9 @@
           <a:lstStyle/>
           <a:p>
             <a:r>
-              <a:rPr lang="en-US" smtClean="0"/>
+              <a:rPr lang="en-US"/>
               <a:t>Click to edit Master title style</a:t>
             </a:r>
-            <a:endParaRPr lang="en-US"/>
           </a:p>
         </p:txBody>
       </p:sp>
@@ -1209,38 +1216,37 @@
           <a:p>
             <a:pPr lvl="0"/>
             <a:r>
-              <a:rPr lang="en-US" smtClean="0"/>
+              <a:rPr lang="en-US"/>
               <a:t>Click to edit Master text styles</a:t>
             </a:r>
           </a:p>
           <a:p>
             <a:pPr lvl="1"/>
             <a:r>
-              <a:rPr lang="en-US" smtClean="0"/>
+              <a:rPr lang="en-US"/>
               <a:t>Second level</a:t>
             </a:r>
           </a:p>
           <a:p>
             <a:pPr lvl="2"/>
             <a:r>
-              <a:rPr lang="en-US" smtClean="0"/>
+              <a:rPr lang="en-US"/>
               <a:t>Third level</a:t>
             </a:r>
           </a:p>
           <a:p>
             <a:pPr lvl="3"/>
             <a:r>
-              <a:rPr lang="en-US" smtClean="0"/>
+              <a:rPr lang="en-US"/>
               <a:t>Fourth level</a:t>
             </a:r>
           </a:p>
           <a:p>
             <a:pPr lvl="4"/>
             <a:r>
-              <a:rPr lang="en-US" smtClean="0"/>
+              <a:rPr lang="en-US"/>
               <a:t>Fifth level</a:t>
             </a:r>
-            <a:endParaRPr lang="en-US"/>
           </a:p>
         </p:txBody>
       </p:sp>
@@ -1294,38 +1300,37 @@
           <a:p>
             <a:pPr lvl="0"/>
             <a:r>
-              <a:rPr lang="en-US" smtClean="0"/>
+              <a:rPr lang="en-US"/>
               <a:t>Click to edit Master text styles</a:t>
             </a:r>
           </a:p>
           <a:p>
             <a:pPr lvl="1"/>
             <a:r>
-              <a:rPr lang="en-US" smtClean="0"/>
+              <a:rPr lang="en-US"/>
               <a:t>Second level</a:t>
             </a:r>
           </a:p>
           <a:p>
             <a:pPr lvl="2"/>
             <a:r>
-              <a:rPr lang="en-US" smtClean="0"/>
+              <a:rPr lang="en-US"/>
               <a:t>Third level</a:t>
             </a:r>
           </a:p>
           <a:p>
             <a:pPr lvl="3"/>
             <a:r>
-              <a:rPr lang="en-US" smtClean="0"/>
+              <a:rPr lang="en-US"/>
               <a:t>Fourth level</a:t>
             </a:r>
           </a:p>
           <a:p>
             <a:pPr lvl="4"/>
             <a:r>
-              <a:rPr lang="en-US" smtClean="0"/>
+              <a:rPr lang="en-US"/>
               <a:t>Fifth level</a:t>
             </a:r>
-            <a:endParaRPr lang="en-US"/>
           </a:p>
         </p:txBody>
       </p:sp>
@@ -1346,7 +1351,7 @@
           <a:p>
             <a:fld id="{BC7EBC0B-66B3-6748-B539-3251E59579B9}" type="datetimeFigureOut">
               <a:rPr lang="en-US" smtClean="0"/>
-              <a:t>11/14/18</a:t>
+              <a:t>4/25/24</a:t>
             </a:fld>
             <a:endParaRPr lang="en-US"/>
           </a:p>
@@ -1444,10 +1449,9 @@
           </a:lstStyle>
           <a:p>
             <a:r>
-              <a:rPr lang="en-US" smtClean="0"/>
+              <a:rPr lang="en-US"/>
               <a:t>Click to edit Master title style</a:t>
             </a:r>
-            <a:endParaRPr lang="en-US"/>
           </a:p>
         </p:txBody>
       </p:sp>
@@ -1510,7 +1514,7 @@
           <a:p>
             <a:pPr lvl="0"/>
             <a:r>
-              <a:rPr lang="en-US" smtClean="0"/>
+              <a:rPr lang="en-US"/>
               <a:t>Click to edit Master text styles</a:t>
             </a:r>
           </a:p>
@@ -1566,38 +1570,37 @@
           <a:p>
             <a:pPr lvl="0"/>
             <a:r>
-              <a:rPr lang="en-US" smtClean="0"/>
+              <a:rPr lang="en-US"/>
               <a:t>Click to edit Master text styles</a:t>
             </a:r>
           </a:p>
           <a:p>
             <a:pPr lvl="1"/>
             <a:r>
-              <a:rPr lang="en-US" smtClean="0"/>
+              <a:rPr lang="en-US"/>
               <a:t>Second level</a:t>
             </a:r>
           </a:p>
           <a:p>
             <a:pPr lvl="2"/>
             <a:r>
-              <a:rPr lang="en-US" smtClean="0"/>
+              <a:rPr lang="en-US"/>
               <a:t>Third level</a:t>
             </a:r>
           </a:p>
           <a:p>
             <a:pPr lvl="3"/>
             <a:r>
-              <a:rPr lang="en-US" smtClean="0"/>
+              <a:rPr lang="en-US"/>
               <a:t>Fourth level</a:t>
             </a:r>
           </a:p>
           <a:p>
             <a:pPr lvl="4"/>
             <a:r>
-              <a:rPr lang="en-US" smtClean="0"/>
+              <a:rPr lang="en-US"/>
               <a:t>Fifth level</a:t>
             </a:r>
-            <a:endParaRPr lang="en-US"/>
           </a:p>
         </p:txBody>
       </p:sp>
@@ -1660,7 +1663,7 @@
           <a:p>
             <a:pPr lvl="0"/>
             <a:r>
-              <a:rPr lang="en-US" smtClean="0"/>
+              <a:rPr lang="en-US"/>
               <a:t>Click to edit Master text styles</a:t>
             </a:r>
           </a:p>
@@ -1716,38 +1719,37 @@
           <a:p>
             <a:pPr lvl="0"/>
             <a:r>
-              <a:rPr lang="en-US" smtClean="0"/>
+              <a:rPr lang="en-US"/>
               <a:t>Click to edit Master text styles</a:t>
             </a:r>
           </a:p>
           <a:p>
             <a:pPr lvl="1"/>
             <a:r>
-              <a:rPr lang="en-US" smtClean="0"/>
+              <a:rPr lang="en-US"/>
               <a:t>Second level</a:t>
             </a:r>
           </a:p>
           <a:p>
             <a:pPr lvl="2"/>
             <a:r>
-              <a:rPr lang="en-US" smtClean="0"/>
+              <a:rPr lang="en-US"/>
               <a:t>Third level</a:t>
             </a:r>
           </a:p>
           <a:p>
             <a:pPr lvl="3"/>
             <a:r>
-              <a:rPr lang="en-US" smtClean="0"/>
+              <a:rPr lang="en-US"/>
               <a:t>Fourth level</a:t>
             </a:r>
           </a:p>
           <a:p>
             <a:pPr lvl="4"/>
             <a:r>
-              <a:rPr lang="en-US" smtClean="0"/>
+              <a:rPr lang="en-US"/>
               <a:t>Fifth level</a:t>
             </a:r>
-            <a:endParaRPr lang="en-US"/>
           </a:p>
         </p:txBody>
       </p:sp>
@@ -1768,7 +1770,7 @@
           <a:p>
             <a:fld id="{BC7EBC0B-66B3-6748-B539-3251E59579B9}" type="datetimeFigureOut">
               <a:rPr lang="en-US" smtClean="0"/>
-              <a:t>11/14/18</a:t>
+              <a:t>4/25/24</a:t>
             </a:fld>
             <a:endParaRPr lang="en-US"/>
           </a:p>
@@ -1862,10 +1864,9 @@
           <a:lstStyle/>
           <a:p>
             <a:r>
-              <a:rPr lang="en-US" smtClean="0"/>
+              <a:rPr lang="en-US"/>
               <a:t>Click to edit Master title style</a:t>
             </a:r>
-            <a:endParaRPr lang="en-US"/>
           </a:p>
         </p:txBody>
       </p:sp>
@@ -1886,7 +1887,7 @@
           <a:p>
             <a:fld id="{BC7EBC0B-66B3-6748-B539-3251E59579B9}" type="datetimeFigureOut">
               <a:rPr lang="en-US" smtClean="0"/>
-              <a:t>11/14/18</a:t>
+              <a:t>4/25/24</a:t>
             </a:fld>
             <a:endParaRPr lang="en-US"/>
           </a:p>
@@ -1981,7 +1982,7 @@
           <a:p>
             <a:fld id="{BC7EBC0B-66B3-6748-B539-3251E59579B9}" type="datetimeFigureOut">
               <a:rPr lang="en-US" smtClean="0"/>
-              <a:t>11/14/18</a:t>
+              <a:t>4/25/24</a:t>
             </a:fld>
             <a:endParaRPr lang="en-US"/>
           </a:p>
@@ -2084,10 +2085,9 @@
           </a:lstStyle>
           <a:p>
             <a:r>
-              <a:rPr lang="en-US" smtClean="0"/>
+              <a:rPr lang="en-US"/>
               <a:t>Click to edit Master title style</a:t>
             </a:r>
-            <a:endParaRPr lang="en-US"/>
           </a:p>
         </p:txBody>
       </p:sp>
@@ -2141,38 +2141,37 @@
           <a:p>
             <a:pPr lvl="0"/>
             <a:r>
-              <a:rPr lang="en-US" smtClean="0"/>
+              <a:rPr lang="en-US"/>
               <a:t>Click to edit Master text styles</a:t>
             </a:r>
           </a:p>
           <a:p>
             <a:pPr lvl="1"/>
             <a:r>
-              <a:rPr lang="en-US" smtClean="0"/>
+              <a:rPr lang="en-US"/>
               <a:t>Second level</a:t>
             </a:r>
           </a:p>
           <a:p>
             <a:pPr lvl="2"/>
             <a:r>
-              <a:rPr lang="en-US" smtClean="0"/>
+              <a:rPr lang="en-US"/>
               <a:t>Third level</a:t>
             </a:r>
           </a:p>
           <a:p>
             <a:pPr lvl="3"/>
             <a:r>
-              <a:rPr lang="en-US" smtClean="0"/>
+              <a:rPr lang="en-US"/>
               <a:t>Fourth level</a:t>
             </a:r>
           </a:p>
           <a:p>
             <a:pPr lvl="4"/>
             <a:r>
-              <a:rPr lang="en-US" smtClean="0"/>
+              <a:rPr lang="en-US"/>
               <a:t>Fifth level</a:t>
             </a:r>
-            <a:endParaRPr lang="en-US"/>
           </a:p>
         </p:txBody>
       </p:sp>
@@ -2235,7 +2234,7 @@
           <a:p>
             <a:pPr lvl="0"/>
             <a:r>
-              <a:rPr lang="en-US" smtClean="0"/>
+              <a:rPr lang="en-US"/>
               <a:t>Click to edit Master text styles</a:t>
             </a:r>
           </a:p>
@@ -2258,7 +2257,7 @@
           <a:p>
             <a:fld id="{BC7EBC0B-66B3-6748-B539-3251E59579B9}" type="datetimeFigureOut">
               <a:rPr lang="en-US" smtClean="0"/>
-              <a:t>11/14/18</a:t>
+              <a:t>4/25/24</a:t>
             </a:fld>
             <a:endParaRPr lang="en-US"/>
           </a:p>
@@ -2361,10 +2360,9 @@
           </a:lstStyle>
           <a:p>
             <a:r>
-              <a:rPr lang="en-US" smtClean="0"/>
+              <a:rPr lang="en-US"/>
               <a:t>Click to edit Master title style</a:t>
             </a:r>
-            <a:endParaRPr lang="en-US"/>
           </a:p>
         </p:txBody>
       </p:sp>
@@ -2488,7 +2486,7 @@
           <a:p>
             <a:pPr lvl="0"/>
             <a:r>
-              <a:rPr lang="en-US" smtClean="0"/>
+              <a:rPr lang="en-US"/>
               <a:t>Click to edit Master text styles</a:t>
             </a:r>
           </a:p>
@@ -2511,7 +2509,7 @@
           <a:p>
             <a:fld id="{BC7EBC0B-66B3-6748-B539-3251E59579B9}" type="datetimeFigureOut">
               <a:rPr lang="en-US" smtClean="0"/>
-              <a:t>11/14/18</a:t>
+              <a:t>4/25/24</a:t>
             </a:fld>
             <a:endParaRPr lang="en-US"/>
           </a:p>
@@ -2620,10 +2618,9 @@
           <a:lstStyle/>
           <a:p>
             <a:r>
-              <a:rPr lang="en-US" smtClean="0"/>
+              <a:rPr lang="en-US"/>
               <a:t>Click to edit Master title style</a:t>
             </a:r>
-            <a:endParaRPr lang="en-US"/>
           </a:p>
         </p:txBody>
       </p:sp>
@@ -2654,38 +2651,37 @@
           <a:p>
             <a:pPr lvl="0"/>
             <a:r>
-              <a:rPr lang="en-US" smtClean="0"/>
+              <a:rPr lang="en-US"/>
               <a:t>Click to edit Master text styles</a:t>
             </a:r>
           </a:p>
           <a:p>
             <a:pPr lvl="1"/>
             <a:r>
-              <a:rPr lang="en-US" smtClean="0"/>
+              <a:rPr lang="en-US"/>
               <a:t>Second level</a:t>
             </a:r>
           </a:p>
           <a:p>
             <a:pPr lvl="2"/>
             <a:r>
-              <a:rPr lang="en-US" smtClean="0"/>
+              <a:rPr lang="en-US"/>
               <a:t>Third level</a:t>
             </a:r>
           </a:p>
           <a:p>
             <a:pPr lvl="3"/>
             <a:r>
-              <a:rPr lang="en-US" smtClean="0"/>
+              <a:rPr lang="en-US"/>
               <a:t>Fourth level</a:t>
             </a:r>
           </a:p>
           <a:p>
             <a:pPr lvl="4"/>
             <a:r>
-              <a:rPr lang="en-US" smtClean="0"/>
+              <a:rPr lang="en-US"/>
               <a:t>Fifth level</a:t>
             </a:r>
-            <a:endParaRPr lang="en-US"/>
           </a:p>
         </p:txBody>
       </p:sp>
@@ -2724,7 +2720,7 @@
           <a:p>
             <a:fld id="{BC7EBC0B-66B3-6748-B539-3251E59579B9}" type="datetimeFigureOut">
               <a:rPr lang="en-US" smtClean="0"/>
-              <a:t>11/14/18</a:t>
+              <a:t>4/25/24</a:t>
             </a:fld>
             <a:endParaRPr lang="en-US"/>
           </a:p>
@@ -3363,14 +3359,14 @@
             </a:ln>
             <a:extLst>
               <a:ext uri="{909E8E84-426E-40dd-AFC4-6F175D3DCCD1}">
-                <a14:hiddenFill xmlns:a14="http://schemas.microsoft.com/office/drawing/2010/main">
+                <a14:hiddenFill xmlns:a14="http://schemas.microsoft.com/office/drawing/2010/main" xmlns="">
                   <a:solidFill>
                     <a:srgbClr val="FFFFFF"/>
                   </a:solidFill>
                 </a14:hiddenFill>
               </a:ext>
               <a:ext uri="{91240B29-F687-4f45-9708-019B960494DF}">
-                <a14:hiddenLine xmlns:a14="http://schemas.microsoft.com/office/drawing/2010/main" w="9525">
+                <a14:hiddenLine xmlns:a14="http://schemas.microsoft.com/office/drawing/2010/main" xmlns="" w="9525">
                   <a:solidFill>
                     <a:srgbClr val="000000"/>
                   </a:solidFill>
@@ -3556,18 +3552,13 @@
                 <a:defRPr/>
               </a:pPr>
               <a:r>
-                <a:rPr lang="en-US" sz="1200" dirty="0" smtClean="0">
+                <a:rPr lang="en-US" sz="1200" dirty="0">
                   <a:solidFill>
                     <a:schemeClr val="tx1"/>
                   </a:solidFill>
                 </a:rPr>
                 <a:t>HISAT2</a:t>
               </a:r>
-              <a:endParaRPr lang="en-US" sz="1200" dirty="0">
-                <a:solidFill>
-                  <a:schemeClr val="tx1"/>
-                </a:solidFill>
-              </a:endParaRPr>
             </a:p>
           </p:txBody>
         </p:sp>
@@ -3593,14 +3584,14 @@
             </a:ln>
             <a:extLst>
               <a:ext uri="{909E8E84-426E-40dd-AFC4-6F175D3DCCD1}">
-                <a14:hiddenFill xmlns:a14="http://schemas.microsoft.com/office/drawing/2010/main">
+                <a14:hiddenFill xmlns:a14="http://schemas.microsoft.com/office/drawing/2010/main" xmlns="">
                   <a:solidFill>
                     <a:srgbClr val="FFFFFF"/>
                   </a:solidFill>
                 </a14:hiddenFill>
               </a:ext>
               <a:ext uri="{91240B29-F687-4f45-9708-019B960494DF}">
-                <a14:hiddenLine xmlns:a14="http://schemas.microsoft.com/office/drawing/2010/main" w="9525">
+                <a14:hiddenLine xmlns:a14="http://schemas.microsoft.com/office/drawing/2010/main" xmlns="" w="9525">
                   <a:solidFill>
                     <a:srgbClr val="000000"/>
                   </a:solidFill>
@@ -3786,7 +3777,7 @@
                 <a:defRPr/>
               </a:pPr>
               <a:r>
-                <a:rPr lang="en-US" sz="1200" dirty="0" err="1" smtClean="0">
+                <a:rPr lang="en-US" sz="1200" dirty="0" err="1">
                   <a:solidFill>
                     <a:schemeClr val="tx1"/>
                   </a:solidFill>
@@ -3823,14 +3814,14 @@
             </a:ln>
             <a:extLst>
               <a:ext uri="{909E8E84-426E-40dd-AFC4-6F175D3DCCD1}">
-                <a14:hiddenFill xmlns:a14="http://schemas.microsoft.com/office/drawing/2010/main">
+                <a14:hiddenFill xmlns:a14="http://schemas.microsoft.com/office/drawing/2010/main" xmlns="">
                   <a:solidFill>
                     <a:srgbClr val="FFFFFF"/>
                   </a:solidFill>
                 </a14:hiddenFill>
               </a:ext>
               <a:ext uri="{91240B29-F687-4f45-9708-019B960494DF}">
-                <a14:hiddenLine xmlns:a14="http://schemas.microsoft.com/office/drawing/2010/main" w="9525">
+                <a14:hiddenLine xmlns:a14="http://schemas.microsoft.com/office/drawing/2010/main" xmlns="" w="9525">
                   <a:solidFill>
                     <a:srgbClr val="000000"/>
                   </a:solidFill>
@@ -4016,7 +4007,7 @@
                 <a:defRPr/>
               </a:pPr>
               <a:r>
-                <a:rPr lang="en-US" sz="1200" dirty="0" err="1" smtClean="0">
+                <a:rPr lang="en-US" sz="1200" dirty="0" err="1">
                   <a:solidFill>
                     <a:schemeClr val="tx1"/>
                   </a:solidFill>
@@ -4053,14 +4044,14 @@
             </a:ln>
             <a:extLst>
               <a:ext uri="{909E8E84-426E-40dd-AFC4-6F175D3DCCD1}">
-                <a14:hiddenFill xmlns:a14="http://schemas.microsoft.com/office/drawing/2010/main">
+                <a14:hiddenFill xmlns:a14="http://schemas.microsoft.com/office/drawing/2010/main" xmlns="">
                   <a:solidFill>
                     <a:srgbClr val="FFFFFF"/>
                   </a:solidFill>
                 </a14:hiddenFill>
               </a:ext>
               <a:ext uri="{91240B29-F687-4f45-9708-019B960494DF}">
-                <a14:hiddenLine xmlns:a14="http://schemas.microsoft.com/office/drawing/2010/main" w="9525">
+                <a14:hiddenLine xmlns:a14="http://schemas.microsoft.com/office/drawing/2010/main" xmlns="" w="9525">
                   <a:solidFill>
                     <a:srgbClr val="000000"/>
                   </a:solidFill>
@@ -4186,10 +4177,9 @@
             <a:p>
               <a:pPr algn="ctr" eaLnBrk="1" hangingPunct="1"/>
               <a:r>
-                <a:rPr lang="en-US" sz="1400" b="1" dirty="0" smtClean="0"/>
+                <a:rPr lang="en-US" sz="1400" b="1" dirty="0"/>
                 <a:t>Expression estimation</a:t>
               </a:r>
-              <a:endParaRPr lang="en-US" sz="1400" b="1" dirty="0"/>
             </a:p>
           </p:txBody>
         </p:sp>
@@ -4247,7 +4237,7 @@
                 <a:defRPr/>
               </a:pPr>
               <a:r>
-                <a:rPr lang="en-US" sz="1200" dirty="0" err="1" smtClean="0">
+                <a:rPr lang="en-US" sz="1200" dirty="0" err="1">
                   <a:solidFill>
                     <a:schemeClr val="tx1"/>
                   </a:solidFill>
@@ -4284,14 +4274,14 @@
             </a:ln>
             <a:extLst>
               <a:ext uri="{909E8E84-426E-40dd-AFC4-6F175D3DCCD1}">
-                <a14:hiddenFill xmlns:a14="http://schemas.microsoft.com/office/drawing/2010/main">
+                <a14:hiddenFill xmlns:a14="http://schemas.microsoft.com/office/drawing/2010/main" xmlns="">
                   <a:solidFill>
                     <a:srgbClr val="FFFFFF"/>
                   </a:solidFill>
                 </a14:hiddenFill>
               </a:ext>
               <a:ext uri="{91240B29-F687-4f45-9708-019B960494DF}">
-                <a14:hiddenLine xmlns:a14="http://schemas.microsoft.com/office/drawing/2010/main" w="9525">
+                <a14:hiddenLine xmlns:a14="http://schemas.microsoft.com/office/drawing/2010/main" xmlns="" w="9525">
                   <a:solidFill>
                     <a:srgbClr val="000000"/>
                   </a:solidFill>
@@ -4477,7 +4467,7 @@
                 <a:defRPr/>
               </a:pPr>
               <a:r>
-                <a:rPr lang="en-US" sz="1200" dirty="0" err="1" smtClean="0">
+                <a:rPr lang="en-US" sz="1200" dirty="0" err="1">
                   <a:solidFill>
                     <a:schemeClr val="tx1"/>
                   </a:solidFill>
@@ -4485,18 +4475,13 @@
                 <a:t>Ballgown</a:t>
               </a:r>
               <a:r>
-                <a:rPr lang="en-US" sz="1200" dirty="0" smtClean="0">
+                <a:rPr lang="en-US" sz="1200" dirty="0">
                   <a:solidFill>
                     <a:schemeClr val="tx1"/>
                   </a:solidFill>
                 </a:rPr>
                 <a:t> &amp; R</a:t>
               </a:r>
-              <a:endParaRPr lang="en-US" sz="1200" dirty="0">
-                <a:solidFill>
-                  <a:schemeClr val="tx1"/>
-                </a:solidFill>
-              </a:endParaRPr>
             </a:p>
           </p:txBody>
         </p:sp>
@@ -4522,14 +4507,14 @@
             </a:ln>
             <a:extLst>
               <a:ext uri="{909E8E84-426E-40dd-AFC4-6F175D3DCCD1}">
-                <a14:hiddenFill xmlns:a14="http://schemas.microsoft.com/office/drawing/2010/main">
+                <a14:hiddenFill xmlns:a14="http://schemas.microsoft.com/office/drawing/2010/main" xmlns="">
                   <a:solidFill>
                     <a:srgbClr val="FFFFFF"/>
                   </a:solidFill>
                 </a14:hiddenFill>
               </a:ext>
               <a:ext uri="{91240B29-F687-4f45-9708-019B960494DF}">
-                <a14:hiddenLine xmlns:a14="http://schemas.microsoft.com/office/drawing/2010/main" w="9525">
+                <a14:hiddenLine xmlns:a14="http://schemas.microsoft.com/office/drawing/2010/main" xmlns="" w="9525">
                   <a:solidFill>
                     <a:srgbClr val="000000"/>
                   </a:solidFill>
@@ -5200,14 +5185,14 @@
           </a:ln>
           <a:extLst>
             <a:ext uri="{909E8E84-426E-40dd-AFC4-6F175D3DCCD1}">
-              <a14:hiddenFill xmlns:a14="http://schemas.microsoft.com/office/drawing/2010/main">
+              <a14:hiddenFill xmlns:a14="http://schemas.microsoft.com/office/drawing/2010/main" xmlns="">
                 <a:solidFill>
                   <a:srgbClr val="FFFFFF"/>
                 </a:solidFill>
               </a14:hiddenFill>
             </a:ext>
             <a:ext uri="{91240B29-F687-4f45-9708-019B960494DF}">
-              <a14:hiddenLine xmlns:a14="http://schemas.microsoft.com/office/drawing/2010/main" w="9525">
+              <a14:hiddenLine xmlns:a14="http://schemas.microsoft.com/office/drawing/2010/main" xmlns="" w="9525">
                 <a:solidFill>
                   <a:srgbClr val="000000"/>
                 </a:solidFill>
@@ -5633,14 +5618,14 @@
             </a:ln>
             <a:extLst>
               <a:ext uri="{909E8E84-426E-40dd-AFC4-6F175D3DCCD1}">
-                <a14:hiddenFill xmlns:a14="http://schemas.microsoft.com/office/drawing/2010/main">
+                <a14:hiddenFill xmlns:a14="http://schemas.microsoft.com/office/drawing/2010/main" xmlns="">
                   <a:solidFill>
                     <a:srgbClr val="FFFFFF"/>
                   </a:solidFill>
                 </a14:hiddenFill>
               </a:ext>
               <a:ext uri="{91240B29-F687-4f45-9708-019B960494DF}">
-                <a14:hiddenLine xmlns:a14="http://schemas.microsoft.com/office/drawing/2010/main" w="9525">
+                <a14:hiddenLine xmlns:a14="http://schemas.microsoft.com/office/drawing/2010/main" xmlns="" w="9525">
                   <a:solidFill>
                     <a:srgbClr val="000000"/>
                   </a:solidFill>
@@ -5826,18 +5811,13 @@
                 <a:defRPr/>
               </a:pPr>
               <a:r>
-                <a:rPr lang="en-US" sz="1200" dirty="0" smtClean="0">
+                <a:rPr lang="en-US" sz="1200" dirty="0">
                   <a:solidFill>
                     <a:schemeClr val="tx1"/>
                   </a:solidFill>
                 </a:rPr>
                 <a:t>HISAT2</a:t>
               </a:r>
-              <a:endParaRPr lang="en-US" sz="1200" dirty="0">
-                <a:solidFill>
-                  <a:schemeClr val="tx1"/>
-                </a:solidFill>
-              </a:endParaRPr>
             </a:p>
           </p:txBody>
         </p:sp>
@@ -5863,14 +5843,14 @@
             </a:ln>
             <a:extLst>
               <a:ext uri="{909E8E84-426E-40dd-AFC4-6F175D3DCCD1}">
-                <a14:hiddenFill xmlns:a14="http://schemas.microsoft.com/office/drawing/2010/main">
+                <a14:hiddenFill xmlns:a14="http://schemas.microsoft.com/office/drawing/2010/main" xmlns="">
                   <a:solidFill>
                     <a:srgbClr val="FFFFFF"/>
                   </a:solidFill>
                 </a14:hiddenFill>
               </a:ext>
               <a:ext uri="{91240B29-F687-4f45-9708-019B960494DF}">
-                <a14:hiddenLine xmlns:a14="http://schemas.microsoft.com/office/drawing/2010/main" w="9525">
+                <a14:hiddenLine xmlns:a14="http://schemas.microsoft.com/office/drawing/2010/main" xmlns="" w="9525">
                   <a:solidFill>
                     <a:srgbClr val="000000"/>
                   </a:solidFill>
@@ -6056,7 +6036,7 @@
                 <a:defRPr/>
               </a:pPr>
               <a:r>
-                <a:rPr lang="en-US" sz="1200" dirty="0" err="1" smtClean="0">
+                <a:rPr lang="en-US" sz="1200" dirty="0" err="1">
                   <a:solidFill>
                     <a:schemeClr val="tx1"/>
                   </a:solidFill>
@@ -6093,14 +6073,14 @@
             </a:ln>
             <a:extLst>
               <a:ext uri="{909E8E84-426E-40dd-AFC4-6F175D3DCCD1}">
-                <a14:hiddenFill xmlns:a14="http://schemas.microsoft.com/office/drawing/2010/main">
+                <a14:hiddenFill xmlns:a14="http://schemas.microsoft.com/office/drawing/2010/main" xmlns="">
                   <a:solidFill>
                     <a:srgbClr val="FFFFFF"/>
                   </a:solidFill>
                 </a14:hiddenFill>
               </a:ext>
               <a:ext uri="{91240B29-F687-4f45-9708-019B960494DF}">
-                <a14:hiddenLine xmlns:a14="http://schemas.microsoft.com/office/drawing/2010/main" w="9525">
+                <a14:hiddenLine xmlns:a14="http://schemas.microsoft.com/office/drawing/2010/main" xmlns="" w="9525">
                   <a:solidFill>
                     <a:srgbClr val="000000"/>
                   </a:solidFill>
@@ -6286,7 +6266,7 @@
                 <a:defRPr/>
               </a:pPr>
               <a:r>
-                <a:rPr lang="en-US" sz="1200" dirty="0" err="1" smtClean="0">
+                <a:rPr lang="en-US" sz="1200" dirty="0" err="1">
                   <a:solidFill>
                     <a:schemeClr val="tx1"/>
                   </a:solidFill>
@@ -6323,14 +6303,14 @@
             </a:ln>
             <a:extLst>
               <a:ext uri="{909E8E84-426E-40dd-AFC4-6F175D3DCCD1}">
-                <a14:hiddenFill xmlns:a14="http://schemas.microsoft.com/office/drawing/2010/main">
+                <a14:hiddenFill xmlns:a14="http://schemas.microsoft.com/office/drawing/2010/main" xmlns="">
                   <a:solidFill>
                     <a:srgbClr val="FFFFFF"/>
                   </a:solidFill>
                 </a14:hiddenFill>
               </a:ext>
               <a:ext uri="{91240B29-F687-4f45-9708-019B960494DF}">
-                <a14:hiddenLine xmlns:a14="http://schemas.microsoft.com/office/drawing/2010/main" w="9525">
+                <a14:hiddenLine xmlns:a14="http://schemas.microsoft.com/office/drawing/2010/main" xmlns="" w="9525">
                   <a:solidFill>
                     <a:srgbClr val="000000"/>
                   </a:solidFill>
@@ -6456,10 +6436,9 @@
             <a:p>
               <a:pPr algn="ctr" eaLnBrk="1" hangingPunct="1"/>
               <a:r>
-                <a:rPr lang="en-US" sz="1400" b="1" dirty="0" smtClean="0"/>
+                <a:rPr lang="en-US" sz="1400" b="1" dirty="0"/>
                 <a:t>Expression estimation</a:t>
               </a:r>
-              <a:endParaRPr lang="en-US" sz="1400" b="1" dirty="0"/>
             </a:p>
           </p:txBody>
         </p:sp>
@@ -6517,7 +6496,7 @@
                 <a:defRPr/>
               </a:pPr>
               <a:r>
-                <a:rPr lang="en-US" sz="1200" smtClean="0">
+                <a:rPr lang="en-US" sz="1200">
                   <a:solidFill>
                     <a:schemeClr val="tx1"/>
                   </a:solidFill>
@@ -6554,14 +6533,14 @@
             </a:ln>
             <a:extLst>
               <a:ext uri="{909E8E84-426E-40dd-AFC4-6F175D3DCCD1}">
-                <a14:hiddenFill xmlns:a14="http://schemas.microsoft.com/office/drawing/2010/main">
+                <a14:hiddenFill xmlns:a14="http://schemas.microsoft.com/office/drawing/2010/main" xmlns="">
                   <a:solidFill>
                     <a:srgbClr val="FFFFFF"/>
                   </a:solidFill>
                 </a14:hiddenFill>
               </a:ext>
               <a:ext uri="{91240B29-F687-4f45-9708-019B960494DF}">
-                <a14:hiddenLine xmlns:a14="http://schemas.microsoft.com/office/drawing/2010/main" w="9525">
+                <a14:hiddenLine xmlns:a14="http://schemas.microsoft.com/office/drawing/2010/main" xmlns="" w="9525">
                   <a:solidFill>
                     <a:srgbClr val="000000"/>
                   </a:solidFill>
@@ -6747,7 +6726,7 @@
                 <a:defRPr/>
               </a:pPr>
               <a:r>
-                <a:rPr lang="en-US" sz="1200" dirty="0" err="1" smtClean="0">
+                <a:rPr lang="en-US" sz="1200" dirty="0" err="1">
                   <a:solidFill>
                     <a:schemeClr val="tx1"/>
                   </a:solidFill>
@@ -6755,18 +6734,13 @@
                 <a:t>Ballgown</a:t>
               </a:r>
               <a:r>
-                <a:rPr lang="en-US" sz="1200" dirty="0" smtClean="0">
+                <a:rPr lang="en-US" sz="1200" dirty="0">
                   <a:solidFill>
                     <a:schemeClr val="tx1"/>
                   </a:solidFill>
                 </a:rPr>
                 <a:t> &amp; R</a:t>
               </a:r>
-              <a:endParaRPr lang="en-US" sz="1200" dirty="0">
-                <a:solidFill>
-                  <a:schemeClr val="tx1"/>
-                </a:solidFill>
-              </a:endParaRPr>
             </a:p>
           </p:txBody>
         </p:sp>
@@ -6792,14 +6766,14 @@
             </a:ln>
             <a:extLst>
               <a:ext uri="{909E8E84-426E-40dd-AFC4-6F175D3DCCD1}">
-                <a14:hiddenFill xmlns:a14="http://schemas.microsoft.com/office/drawing/2010/main">
+                <a14:hiddenFill xmlns:a14="http://schemas.microsoft.com/office/drawing/2010/main" xmlns="">
                   <a:solidFill>
                     <a:srgbClr val="FFFFFF"/>
                   </a:solidFill>
                 </a14:hiddenFill>
               </a:ext>
               <a:ext uri="{91240B29-F687-4f45-9708-019B960494DF}">
-                <a14:hiddenLine xmlns:a14="http://schemas.microsoft.com/office/drawing/2010/main" w="9525">
+                <a14:hiddenLine xmlns:a14="http://schemas.microsoft.com/office/drawing/2010/main" xmlns="" w="9525">
                   <a:solidFill>
                     <a:srgbClr val="000000"/>
                   </a:solidFill>
@@ -7470,14 +7444,14 @@
           </a:ln>
           <a:extLst>
             <a:ext uri="{909E8E84-426E-40dd-AFC4-6F175D3DCCD1}">
-              <a14:hiddenFill xmlns:a14="http://schemas.microsoft.com/office/drawing/2010/main">
+              <a14:hiddenFill xmlns:a14="http://schemas.microsoft.com/office/drawing/2010/main" xmlns="">
                 <a:solidFill>
                   <a:srgbClr val="FFFFFF"/>
                 </a:solidFill>
               </a14:hiddenFill>
             </a:ext>
             <a:ext uri="{91240B29-F687-4f45-9708-019B960494DF}">
-              <a14:hiddenLine xmlns:a14="http://schemas.microsoft.com/office/drawing/2010/main" w="9525">
+              <a14:hiddenLine xmlns:a14="http://schemas.microsoft.com/office/drawing/2010/main" xmlns="" w="9525">
                 <a:solidFill>
                   <a:srgbClr val="000000"/>
                 </a:solidFill>
@@ -7631,14 +7605,14 @@
           </a:ln>
           <a:extLst>
             <a:ext uri="{909E8E84-426E-40dd-AFC4-6F175D3DCCD1}">
-              <a14:hiddenFill xmlns:a14="http://schemas.microsoft.com/office/drawing/2010/main">
+              <a14:hiddenFill xmlns:a14="http://schemas.microsoft.com/office/drawing/2010/main" xmlns="">
                 <a:solidFill>
                   <a:srgbClr val="FFFFFF"/>
                 </a:solidFill>
               </a14:hiddenFill>
             </a:ext>
             <a:ext uri="{91240B29-F687-4f45-9708-019B960494DF}">
-              <a14:hiddenLine xmlns:a14="http://schemas.microsoft.com/office/drawing/2010/main" w="9525">
+              <a14:hiddenLine xmlns:a14="http://schemas.microsoft.com/office/drawing/2010/main" xmlns="" w="9525">
                 <a:solidFill>
                   <a:srgbClr val="000000"/>
                 </a:solidFill>
@@ -8032,14 +8006,14 @@
             </a:ln>
             <a:extLst>
               <a:ext uri="{909E8E84-426E-40dd-AFC4-6F175D3DCCD1}">
-                <a14:hiddenFill xmlns:a14="http://schemas.microsoft.com/office/drawing/2010/main">
+                <a14:hiddenFill xmlns:a14="http://schemas.microsoft.com/office/drawing/2010/main" xmlns="">
                   <a:solidFill>
                     <a:srgbClr val="FFFFFF"/>
                   </a:solidFill>
                 </a14:hiddenFill>
               </a:ext>
               <a:ext uri="{91240B29-F687-4f45-9708-019B960494DF}">
-                <a14:hiddenLine xmlns:a14="http://schemas.microsoft.com/office/drawing/2010/main" w="9525">
+                <a14:hiddenLine xmlns:a14="http://schemas.microsoft.com/office/drawing/2010/main" xmlns="" w="9525">
                   <a:solidFill>
                     <a:srgbClr val="000000"/>
                   </a:solidFill>
@@ -8225,18 +8199,13 @@
                 <a:defRPr/>
               </a:pPr>
               <a:r>
-                <a:rPr lang="en-US" sz="1200" dirty="0" smtClean="0">
+                <a:rPr lang="en-US" sz="1200" dirty="0">
                   <a:solidFill>
                     <a:schemeClr val="tx1"/>
                   </a:solidFill>
                 </a:rPr>
                 <a:t>HISAT2</a:t>
               </a:r>
-              <a:endParaRPr lang="en-US" sz="1200" dirty="0">
-                <a:solidFill>
-                  <a:schemeClr val="tx1"/>
-                </a:solidFill>
-              </a:endParaRPr>
             </a:p>
           </p:txBody>
         </p:sp>
@@ -8262,14 +8231,14 @@
             </a:ln>
             <a:extLst>
               <a:ext uri="{909E8E84-426E-40dd-AFC4-6F175D3DCCD1}">
-                <a14:hiddenFill xmlns:a14="http://schemas.microsoft.com/office/drawing/2010/main">
+                <a14:hiddenFill xmlns:a14="http://schemas.microsoft.com/office/drawing/2010/main" xmlns="">
                   <a:solidFill>
                     <a:srgbClr val="FFFFFF"/>
                   </a:solidFill>
                 </a14:hiddenFill>
               </a:ext>
               <a:ext uri="{91240B29-F687-4f45-9708-019B960494DF}">
-                <a14:hiddenLine xmlns:a14="http://schemas.microsoft.com/office/drawing/2010/main" w="9525">
+                <a14:hiddenLine xmlns:a14="http://schemas.microsoft.com/office/drawing/2010/main" xmlns="" w="9525">
                   <a:solidFill>
                     <a:srgbClr val="000000"/>
                   </a:solidFill>
@@ -8455,7 +8424,7 @@
                 <a:defRPr/>
               </a:pPr>
               <a:r>
-                <a:rPr lang="en-US" sz="1200" dirty="0" err="1" smtClean="0">
+                <a:rPr lang="en-US" sz="1200" dirty="0" err="1">
                   <a:solidFill>
                     <a:schemeClr val="tx1"/>
                   </a:solidFill>
@@ -8492,14 +8461,14 @@
             </a:ln>
             <a:extLst>
               <a:ext uri="{909E8E84-426E-40dd-AFC4-6F175D3DCCD1}">
-                <a14:hiddenFill xmlns:a14="http://schemas.microsoft.com/office/drawing/2010/main">
+                <a14:hiddenFill xmlns:a14="http://schemas.microsoft.com/office/drawing/2010/main" xmlns="">
                   <a:solidFill>
                     <a:srgbClr val="FFFFFF"/>
                   </a:solidFill>
                 </a14:hiddenFill>
               </a:ext>
               <a:ext uri="{91240B29-F687-4f45-9708-019B960494DF}">
-                <a14:hiddenLine xmlns:a14="http://schemas.microsoft.com/office/drawing/2010/main" w="9525">
+                <a14:hiddenLine xmlns:a14="http://schemas.microsoft.com/office/drawing/2010/main" xmlns="" w="9525">
                   <a:solidFill>
                     <a:srgbClr val="000000"/>
                   </a:solidFill>
@@ -8685,7 +8654,7 @@
                 <a:defRPr/>
               </a:pPr>
               <a:r>
-                <a:rPr lang="en-US" sz="1200" dirty="0" err="1" smtClean="0">
+                <a:rPr lang="en-US" sz="1200" dirty="0" err="1">
                   <a:solidFill>
                     <a:schemeClr val="tx1"/>
                   </a:solidFill>
@@ -8722,14 +8691,14 @@
             </a:ln>
             <a:extLst>
               <a:ext uri="{909E8E84-426E-40dd-AFC4-6F175D3DCCD1}">
-                <a14:hiddenFill xmlns:a14="http://schemas.microsoft.com/office/drawing/2010/main">
+                <a14:hiddenFill xmlns:a14="http://schemas.microsoft.com/office/drawing/2010/main" xmlns="">
                   <a:solidFill>
                     <a:srgbClr val="FFFFFF"/>
                   </a:solidFill>
                 </a14:hiddenFill>
               </a:ext>
               <a:ext uri="{91240B29-F687-4f45-9708-019B960494DF}">
-                <a14:hiddenLine xmlns:a14="http://schemas.microsoft.com/office/drawing/2010/main" w="9525">
+                <a14:hiddenLine xmlns:a14="http://schemas.microsoft.com/office/drawing/2010/main" xmlns="" w="9525">
                   <a:solidFill>
                     <a:srgbClr val="000000"/>
                   </a:solidFill>
@@ -8855,10 +8824,9 @@
             <a:p>
               <a:pPr algn="ctr" eaLnBrk="1" hangingPunct="1"/>
               <a:r>
-                <a:rPr lang="en-US" sz="1400" b="1" dirty="0" smtClean="0"/>
+                <a:rPr lang="en-US" sz="1400" b="1" dirty="0"/>
                 <a:t>Expression estimation</a:t>
               </a:r>
-              <a:endParaRPr lang="en-US" sz="1400" b="1" dirty="0"/>
             </a:p>
           </p:txBody>
         </p:sp>
@@ -8916,7 +8884,7 @@
                 <a:defRPr/>
               </a:pPr>
               <a:r>
-                <a:rPr lang="en-US" sz="1200" dirty="0" err="1" smtClean="0">
+                <a:rPr lang="en-US" sz="1200" dirty="0" err="1">
                   <a:solidFill>
                     <a:schemeClr val="tx1"/>
                   </a:solidFill>
@@ -8953,14 +8921,14 @@
             </a:ln>
             <a:extLst>
               <a:ext uri="{909E8E84-426E-40dd-AFC4-6F175D3DCCD1}">
-                <a14:hiddenFill xmlns:a14="http://schemas.microsoft.com/office/drawing/2010/main">
+                <a14:hiddenFill xmlns:a14="http://schemas.microsoft.com/office/drawing/2010/main" xmlns="">
                   <a:solidFill>
                     <a:srgbClr val="FFFFFF"/>
                   </a:solidFill>
                 </a14:hiddenFill>
               </a:ext>
               <a:ext uri="{91240B29-F687-4f45-9708-019B960494DF}">
-                <a14:hiddenLine xmlns:a14="http://schemas.microsoft.com/office/drawing/2010/main" w="9525">
+                <a14:hiddenLine xmlns:a14="http://schemas.microsoft.com/office/drawing/2010/main" xmlns="" w="9525">
                   <a:solidFill>
                     <a:srgbClr val="000000"/>
                   </a:solidFill>
@@ -9146,7 +9114,7 @@
                 <a:defRPr/>
               </a:pPr>
               <a:r>
-                <a:rPr lang="en-US" sz="1200" dirty="0" err="1" smtClean="0">
+                <a:rPr lang="en-US" sz="1200" dirty="0" err="1">
                   <a:solidFill>
                     <a:schemeClr val="tx1"/>
                   </a:solidFill>
@@ -9154,18 +9122,13 @@
                 <a:t>Ballgown</a:t>
               </a:r>
               <a:r>
-                <a:rPr lang="en-US" sz="1200" dirty="0" smtClean="0">
+                <a:rPr lang="en-US" sz="1200" dirty="0">
                   <a:solidFill>
                     <a:schemeClr val="tx1"/>
                   </a:solidFill>
                 </a:rPr>
                 <a:t> &amp; R</a:t>
               </a:r>
-              <a:endParaRPr lang="en-US" sz="1200" dirty="0">
-                <a:solidFill>
-                  <a:schemeClr val="tx1"/>
-                </a:solidFill>
-              </a:endParaRPr>
             </a:p>
           </p:txBody>
         </p:sp>
@@ -9191,14 +9154,14 @@
             </a:ln>
             <a:extLst>
               <a:ext uri="{909E8E84-426E-40dd-AFC4-6F175D3DCCD1}">
-                <a14:hiddenFill xmlns:a14="http://schemas.microsoft.com/office/drawing/2010/main">
+                <a14:hiddenFill xmlns:a14="http://schemas.microsoft.com/office/drawing/2010/main" xmlns="">
                   <a:solidFill>
                     <a:srgbClr val="FFFFFF"/>
                   </a:solidFill>
                 </a14:hiddenFill>
               </a:ext>
               <a:ext uri="{91240B29-F687-4f45-9708-019B960494DF}">
-                <a14:hiddenLine xmlns:a14="http://schemas.microsoft.com/office/drawing/2010/main" w="9525">
+                <a14:hiddenLine xmlns:a14="http://schemas.microsoft.com/office/drawing/2010/main" xmlns="" w="9525">
                   <a:solidFill>
                     <a:srgbClr val="000000"/>
                   </a:solidFill>
@@ -9821,14 +9784,14 @@
           </a:ln>
           <a:extLst>
             <a:ext uri="{909E8E84-426E-40dd-AFC4-6F175D3DCCD1}">
-              <a14:hiddenFill xmlns:a14="http://schemas.microsoft.com/office/drawing/2010/main">
+              <a14:hiddenFill xmlns:a14="http://schemas.microsoft.com/office/drawing/2010/main" xmlns="">
                 <a:solidFill>
                   <a:srgbClr val="FFFFFF"/>
                 </a:solidFill>
               </a14:hiddenFill>
             </a:ext>
             <a:ext uri="{91240B29-F687-4f45-9708-019B960494DF}">
-              <a14:hiddenLine xmlns:a14="http://schemas.microsoft.com/office/drawing/2010/main" w="9525">
+              <a14:hiddenLine xmlns:a14="http://schemas.microsoft.com/office/drawing/2010/main" xmlns="" w="9525">
                 <a:solidFill>
                   <a:srgbClr val="000000"/>
                 </a:solidFill>
@@ -9982,14 +9945,14 @@
           </a:ln>
           <a:extLst>
             <a:ext uri="{909E8E84-426E-40dd-AFC4-6F175D3DCCD1}">
-              <a14:hiddenFill xmlns:a14="http://schemas.microsoft.com/office/drawing/2010/main">
+              <a14:hiddenFill xmlns:a14="http://schemas.microsoft.com/office/drawing/2010/main" xmlns="">
                 <a:solidFill>
                   <a:srgbClr val="FFFFFF"/>
                 </a:solidFill>
               </a14:hiddenFill>
             </a:ext>
             <a:ext uri="{91240B29-F687-4f45-9708-019B960494DF}">
-              <a14:hiddenLine xmlns:a14="http://schemas.microsoft.com/office/drawing/2010/main" w="9525">
+              <a14:hiddenLine xmlns:a14="http://schemas.microsoft.com/office/drawing/2010/main" xmlns="" w="9525">
                 <a:solidFill>
                   <a:srgbClr val="000000"/>
                 </a:solidFill>
@@ -10131,13 +10094,6 @@
   <p:clrMapOvr>
     <a:masterClrMapping/>
   </p:clrMapOvr>
-  <p:timing>
-    <p:tnLst>
-      <p:par>
-        <p:cTn xmlns:p14="http://schemas.microsoft.com/office/powerpoint/2010/main" id="1" dur="indefinite" restart="never" nodeType="tmRoot"/>
-      </p:par>
-    </p:tnLst>
-  </p:timing>
 </p:sld>
 </file>
 
@@ -10332,14 +10288,14 @@
           </a:ln>
           <a:extLst>
             <a:ext uri="{909E8E84-426E-40dd-AFC4-6F175D3DCCD1}">
-              <a14:hiddenFill xmlns:a14="http://schemas.microsoft.com/office/drawing/2010/main">
+              <a14:hiddenFill xmlns:a14="http://schemas.microsoft.com/office/drawing/2010/main" xmlns="">
                 <a:solidFill>
                   <a:srgbClr val="FFFFFF"/>
                 </a:solidFill>
               </a14:hiddenFill>
             </a:ext>
             <a:ext uri="{91240B29-F687-4f45-9708-019B960494DF}">
-              <a14:hiddenLine xmlns:a14="http://schemas.microsoft.com/office/drawing/2010/main" w="9525">
+              <a14:hiddenLine xmlns:a14="http://schemas.microsoft.com/office/drawing/2010/main" xmlns="" w="9525">
                 <a:solidFill>
                   <a:srgbClr val="000000"/>
                 </a:solidFill>
@@ -10659,14 +10615,14 @@
             </a:ln>
             <a:extLst>
               <a:ext uri="{909E8E84-426E-40dd-AFC4-6F175D3DCCD1}">
-                <a14:hiddenFill xmlns:a14="http://schemas.microsoft.com/office/drawing/2010/main">
+                <a14:hiddenFill xmlns:a14="http://schemas.microsoft.com/office/drawing/2010/main" xmlns="">
                   <a:solidFill>
                     <a:srgbClr val="FFFFFF"/>
                   </a:solidFill>
                 </a14:hiddenFill>
               </a:ext>
               <a:ext uri="{91240B29-F687-4f45-9708-019B960494DF}">
-                <a14:hiddenLine xmlns:a14="http://schemas.microsoft.com/office/drawing/2010/main" w="9525">
+                <a14:hiddenLine xmlns:a14="http://schemas.microsoft.com/office/drawing/2010/main" xmlns="" w="9525">
                   <a:solidFill>
                     <a:srgbClr val="000000"/>
                   </a:solidFill>
@@ -10852,18 +10808,13 @@
                 <a:defRPr/>
               </a:pPr>
               <a:r>
-                <a:rPr lang="en-US" sz="1200" dirty="0" smtClean="0">
+                <a:rPr lang="en-US" sz="1200" dirty="0">
                   <a:solidFill>
                     <a:schemeClr val="tx1"/>
                   </a:solidFill>
                 </a:rPr>
                 <a:t>HISAT2</a:t>
               </a:r>
-              <a:endParaRPr lang="en-US" sz="1200" dirty="0">
-                <a:solidFill>
-                  <a:schemeClr val="tx1"/>
-                </a:solidFill>
-              </a:endParaRPr>
             </a:p>
           </p:txBody>
         </p:sp>
@@ -10889,14 +10840,14 @@
             </a:ln>
             <a:extLst>
               <a:ext uri="{909E8E84-426E-40dd-AFC4-6F175D3DCCD1}">
-                <a14:hiddenFill xmlns:a14="http://schemas.microsoft.com/office/drawing/2010/main">
+                <a14:hiddenFill xmlns:a14="http://schemas.microsoft.com/office/drawing/2010/main" xmlns="">
                   <a:solidFill>
                     <a:srgbClr val="FFFFFF"/>
                   </a:solidFill>
                 </a14:hiddenFill>
               </a:ext>
               <a:ext uri="{91240B29-F687-4f45-9708-019B960494DF}">
-                <a14:hiddenLine xmlns:a14="http://schemas.microsoft.com/office/drawing/2010/main" w="9525">
+                <a14:hiddenLine xmlns:a14="http://schemas.microsoft.com/office/drawing/2010/main" xmlns="" w="9525">
                   <a:solidFill>
                     <a:srgbClr val="000000"/>
                   </a:solidFill>
@@ -11082,7 +11033,7 @@
                 <a:defRPr/>
               </a:pPr>
               <a:r>
-                <a:rPr lang="en-US" sz="1200" dirty="0" err="1" smtClean="0">
+                <a:rPr lang="en-US" sz="1200" dirty="0" err="1">
                   <a:solidFill>
                     <a:schemeClr val="tx1"/>
                   </a:solidFill>
@@ -11119,14 +11070,14 @@
             </a:ln>
             <a:extLst>
               <a:ext uri="{909E8E84-426E-40dd-AFC4-6F175D3DCCD1}">
-                <a14:hiddenFill xmlns:a14="http://schemas.microsoft.com/office/drawing/2010/main">
+                <a14:hiddenFill xmlns:a14="http://schemas.microsoft.com/office/drawing/2010/main" xmlns="">
                   <a:solidFill>
                     <a:srgbClr val="FFFFFF"/>
                   </a:solidFill>
                 </a14:hiddenFill>
               </a:ext>
               <a:ext uri="{91240B29-F687-4f45-9708-019B960494DF}">
-                <a14:hiddenLine xmlns:a14="http://schemas.microsoft.com/office/drawing/2010/main" w="9525">
+                <a14:hiddenLine xmlns:a14="http://schemas.microsoft.com/office/drawing/2010/main" xmlns="" w="9525">
                   <a:solidFill>
                     <a:srgbClr val="000000"/>
                   </a:solidFill>
@@ -11312,7 +11263,7 @@
                 <a:defRPr/>
               </a:pPr>
               <a:r>
-                <a:rPr lang="en-US" sz="1200" dirty="0" err="1" smtClean="0">
+                <a:rPr lang="en-US" sz="1200" dirty="0" err="1">
                   <a:solidFill>
                     <a:schemeClr val="tx1"/>
                   </a:solidFill>
@@ -11349,14 +11300,14 @@
             </a:ln>
             <a:extLst>
               <a:ext uri="{909E8E84-426E-40dd-AFC4-6F175D3DCCD1}">
-                <a14:hiddenFill xmlns:a14="http://schemas.microsoft.com/office/drawing/2010/main">
+                <a14:hiddenFill xmlns:a14="http://schemas.microsoft.com/office/drawing/2010/main" xmlns="">
                   <a:solidFill>
                     <a:srgbClr val="FFFFFF"/>
                   </a:solidFill>
                 </a14:hiddenFill>
               </a:ext>
               <a:ext uri="{91240B29-F687-4f45-9708-019B960494DF}">
-                <a14:hiddenLine xmlns:a14="http://schemas.microsoft.com/office/drawing/2010/main" w="9525">
+                <a14:hiddenLine xmlns:a14="http://schemas.microsoft.com/office/drawing/2010/main" xmlns="" w="9525">
                   <a:solidFill>
                     <a:srgbClr val="000000"/>
                   </a:solidFill>
@@ -11482,10 +11433,9 @@
             <a:p>
               <a:pPr algn="ctr" eaLnBrk="1" hangingPunct="1"/>
               <a:r>
-                <a:rPr lang="en-US" sz="1400" b="1" dirty="0" smtClean="0"/>
+                <a:rPr lang="en-US" sz="1400" b="1" dirty="0"/>
                 <a:t>Expression estimation</a:t>
               </a:r>
-              <a:endParaRPr lang="en-US" sz="1400" b="1" dirty="0"/>
             </a:p>
           </p:txBody>
         </p:sp>
@@ -11543,7 +11493,7 @@
                 <a:defRPr/>
               </a:pPr>
               <a:r>
-                <a:rPr lang="en-US" sz="1200" dirty="0" err="1" smtClean="0">
+                <a:rPr lang="en-US" sz="1200" dirty="0" err="1">
                   <a:solidFill>
                     <a:schemeClr val="tx1"/>
                   </a:solidFill>
@@ -11580,14 +11530,14 @@
             </a:ln>
             <a:extLst>
               <a:ext uri="{909E8E84-426E-40dd-AFC4-6F175D3DCCD1}">
-                <a14:hiddenFill xmlns:a14="http://schemas.microsoft.com/office/drawing/2010/main">
+                <a14:hiddenFill xmlns:a14="http://schemas.microsoft.com/office/drawing/2010/main" xmlns="">
                   <a:solidFill>
                     <a:srgbClr val="FFFFFF"/>
                   </a:solidFill>
                 </a14:hiddenFill>
               </a:ext>
               <a:ext uri="{91240B29-F687-4f45-9708-019B960494DF}">
-                <a14:hiddenLine xmlns:a14="http://schemas.microsoft.com/office/drawing/2010/main" w="9525">
+                <a14:hiddenLine xmlns:a14="http://schemas.microsoft.com/office/drawing/2010/main" xmlns="" w="9525">
                   <a:solidFill>
                     <a:srgbClr val="000000"/>
                   </a:solidFill>
@@ -11773,7 +11723,7 @@
                 <a:defRPr/>
               </a:pPr>
               <a:r>
-                <a:rPr lang="en-US" sz="1200" dirty="0" err="1" smtClean="0">
+                <a:rPr lang="en-US" sz="1200" dirty="0" err="1">
                   <a:solidFill>
                     <a:schemeClr val="tx1"/>
                   </a:solidFill>
@@ -11781,18 +11731,13 @@
                 <a:t>Ballgown</a:t>
               </a:r>
               <a:r>
-                <a:rPr lang="en-US" sz="1200" dirty="0" smtClean="0">
+                <a:rPr lang="en-US" sz="1200" dirty="0">
                   <a:solidFill>
                     <a:schemeClr val="tx1"/>
                   </a:solidFill>
                 </a:rPr>
                 <a:t> &amp; R</a:t>
               </a:r>
-              <a:endParaRPr lang="en-US" sz="1200" dirty="0">
-                <a:solidFill>
-                  <a:schemeClr val="tx1"/>
-                </a:solidFill>
-              </a:endParaRPr>
             </a:p>
           </p:txBody>
         </p:sp>
@@ -11818,14 +11763,14 @@
             </a:ln>
             <a:extLst>
               <a:ext uri="{909E8E84-426E-40dd-AFC4-6F175D3DCCD1}">
-                <a14:hiddenFill xmlns:a14="http://schemas.microsoft.com/office/drawing/2010/main">
+                <a14:hiddenFill xmlns:a14="http://schemas.microsoft.com/office/drawing/2010/main" xmlns="">
                   <a:solidFill>
                     <a:srgbClr val="FFFFFF"/>
                   </a:solidFill>
                 </a14:hiddenFill>
               </a:ext>
               <a:ext uri="{91240B29-F687-4f45-9708-019B960494DF}">
-                <a14:hiddenLine xmlns:a14="http://schemas.microsoft.com/office/drawing/2010/main" w="9525">
+                <a14:hiddenLine xmlns:a14="http://schemas.microsoft.com/office/drawing/2010/main" xmlns="" w="9525">
                   <a:solidFill>
                     <a:srgbClr val="000000"/>
                   </a:solidFill>
@@ -12496,14 +12441,14 @@
           </a:ln>
           <a:extLst>
             <a:ext uri="{909E8E84-426E-40dd-AFC4-6F175D3DCCD1}">
-              <a14:hiddenFill xmlns:a14="http://schemas.microsoft.com/office/drawing/2010/main">
+              <a14:hiddenFill xmlns:a14="http://schemas.microsoft.com/office/drawing/2010/main" xmlns="">
                 <a:solidFill>
                   <a:srgbClr val="FFFFFF"/>
                 </a:solidFill>
               </a14:hiddenFill>
             </a:ext>
             <a:ext uri="{91240B29-F687-4f45-9708-019B960494DF}">
-              <a14:hiddenLine xmlns:a14="http://schemas.microsoft.com/office/drawing/2010/main" w="9525">
+              <a14:hiddenLine xmlns:a14="http://schemas.microsoft.com/office/drawing/2010/main" xmlns="" w="9525">
                 <a:solidFill>
                   <a:srgbClr val="000000"/>
                 </a:solidFill>
@@ -12649,6 +12594,2503 @@
 </file>
 
 <file path=ppt/slides/slide5.xml><?xml version="1.0" encoding="utf-8"?>
+<p:sld xmlns:a="http://schemas.openxmlformats.org/drawingml/2006/main" xmlns:r="http://schemas.openxmlformats.org/officeDocument/2006/relationships" xmlns:p="http://schemas.openxmlformats.org/presentationml/2006/main">
+  <p:cSld>
+    <p:spTree>
+      <p:nvGrpSpPr>
+        <p:cNvPr id="1" name=""/>
+        <p:cNvGrpSpPr/>
+        <p:nvPr/>
+      </p:nvGrpSpPr>
+      <p:grpSpPr>
+        <a:xfrm>
+          <a:off x="0" y="0"/>
+          <a:ext cx="0" cy="0"/>
+          <a:chOff x="0" y="0"/>
+          <a:chExt cx="0" cy="0"/>
+        </a:xfrm>
+      </p:grpSpPr>
+      <p:sp>
+        <p:nvSpPr>
+          <p:cNvPr id="37" name="Rounded Rectangle 36"/>
+          <p:cNvSpPr/>
+          <p:nvPr/>
+        </p:nvSpPr>
+        <p:spPr>
+          <a:xfrm>
+            <a:off x="3419475" y="1628775"/>
+            <a:ext cx="1657350" cy="1800225"/>
+          </a:xfrm>
+          <a:prstGeom prst="roundRect">
+            <a:avLst/>
+          </a:prstGeom>
+          <a:gradFill flip="none" rotWithShape="1">
+            <a:gsLst>
+              <a:gs pos="0">
+                <a:schemeClr val="dk1">
+                  <a:tint val="50000"/>
+                  <a:satMod val="300000"/>
+                  <a:alpha val="13000"/>
+                </a:schemeClr>
+              </a:gs>
+              <a:gs pos="35000">
+                <a:schemeClr val="dk1">
+                  <a:tint val="37000"/>
+                  <a:satMod val="300000"/>
+                  <a:alpha val="13000"/>
+                </a:schemeClr>
+              </a:gs>
+              <a:gs pos="100000">
+                <a:schemeClr val="dk1">
+                  <a:tint val="15000"/>
+                  <a:satMod val="350000"/>
+                  <a:alpha val="13000"/>
+                </a:schemeClr>
+              </a:gs>
+            </a:gsLst>
+            <a:lin ang="16200000" scaled="1"/>
+            <a:tileRect/>
+          </a:gradFill>
+          <a:ln>
+            <a:prstDash val="dash"/>
+          </a:ln>
+        </p:spPr>
+        <p:style>
+          <a:lnRef idx="1">
+            <a:schemeClr val="dk1"/>
+          </a:lnRef>
+          <a:fillRef idx="2">
+            <a:schemeClr val="dk1"/>
+          </a:fillRef>
+          <a:effectRef idx="1">
+            <a:schemeClr val="dk1"/>
+          </a:effectRef>
+          <a:fontRef idx="minor">
+            <a:schemeClr val="dk1"/>
+          </a:fontRef>
+        </p:style>
+        <p:txBody>
+          <a:bodyPr anchor="ctr"/>
+          <a:lstStyle/>
+          <a:p>
+            <a:pPr algn="ctr">
+              <a:defRPr/>
+            </a:pPr>
+            <a:endParaRPr lang="en-US">
+              <a:ln w="76200" cmpd="sng">
+                <a:noFill/>
+                <a:prstDash val="dot"/>
+              </a:ln>
+              <a:noFill/>
+            </a:endParaRPr>
+          </a:p>
+        </p:txBody>
+      </p:sp>
+      <p:sp>
+        <p:nvSpPr>
+          <p:cNvPr id="4" name="Rounded Rectangle 3"/>
+          <p:cNvSpPr/>
+          <p:nvPr/>
+        </p:nvSpPr>
+        <p:spPr>
+          <a:xfrm>
+            <a:off x="5076825" y="1628775"/>
+            <a:ext cx="3382963" cy="3600450"/>
+          </a:xfrm>
+          <a:prstGeom prst="roundRect">
+            <a:avLst/>
+          </a:prstGeom>
+          <a:gradFill flip="none" rotWithShape="1">
+            <a:gsLst>
+              <a:gs pos="0">
+                <a:schemeClr val="dk1">
+                  <a:tint val="50000"/>
+                  <a:satMod val="300000"/>
+                  <a:alpha val="13000"/>
+                </a:schemeClr>
+              </a:gs>
+              <a:gs pos="35000">
+                <a:schemeClr val="dk1">
+                  <a:tint val="37000"/>
+                  <a:satMod val="300000"/>
+                  <a:alpha val="13000"/>
+                </a:schemeClr>
+              </a:gs>
+              <a:gs pos="100000">
+                <a:schemeClr val="dk1">
+                  <a:tint val="15000"/>
+                  <a:satMod val="350000"/>
+                  <a:alpha val="13000"/>
+                </a:schemeClr>
+              </a:gs>
+            </a:gsLst>
+            <a:lin ang="16200000" scaled="1"/>
+            <a:tileRect/>
+          </a:gradFill>
+          <a:ln>
+            <a:prstDash val="dash"/>
+          </a:ln>
+        </p:spPr>
+        <p:style>
+          <a:lnRef idx="1">
+            <a:schemeClr val="dk1"/>
+          </a:lnRef>
+          <a:fillRef idx="2">
+            <a:schemeClr val="dk1"/>
+          </a:fillRef>
+          <a:effectRef idx="1">
+            <a:schemeClr val="dk1"/>
+          </a:effectRef>
+          <a:fontRef idx="minor">
+            <a:schemeClr val="dk1"/>
+          </a:fontRef>
+        </p:style>
+        <p:txBody>
+          <a:bodyPr anchor="ctr"/>
+          <a:lstStyle/>
+          <a:p>
+            <a:pPr algn="ctr">
+              <a:defRPr/>
+            </a:pPr>
+            <a:endParaRPr lang="en-US">
+              <a:ln w="76200" cmpd="sng">
+                <a:noFill/>
+                <a:prstDash val="dot"/>
+              </a:ln>
+              <a:noFill/>
+            </a:endParaRPr>
+          </a:p>
+        </p:txBody>
+      </p:sp>
+      <p:sp>
+        <p:nvSpPr>
+          <p:cNvPr id="5" name="TextBox 3"/>
+          <p:cNvSpPr txBox="1">
+            <a:spLocks noChangeArrowheads="1"/>
+          </p:cNvSpPr>
+          <p:nvPr/>
+        </p:nvSpPr>
+        <p:spPr bwMode="auto">
+          <a:xfrm>
+            <a:off x="6230938" y="5229225"/>
+            <a:ext cx="1073832" cy="338554"/>
+          </a:xfrm>
+          <a:prstGeom prst="rect">
+            <a:avLst/>
+          </a:prstGeom>
+          <a:noFill/>
+          <a:ln>
+            <a:noFill/>
+          </a:ln>
+          <a:extLst>
+            <a:ext uri="{909E8E84-426E-40dd-AFC4-6F175D3DCCD1}">
+              <a14:hiddenFill xmlns:a14="http://schemas.microsoft.com/office/drawing/2010/main" xmlns="">
+                <a:solidFill>
+                  <a:srgbClr val="FFFFFF"/>
+                </a:solidFill>
+              </a14:hiddenFill>
+            </a:ext>
+            <a:ext uri="{91240B29-F687-4f45-9708-019B960494DF}">
+              <a14:hiddenLine xmlns:a14="http://schemas.microsoft.com/office/drawing/2010/main" xmlns="" w="9525">
+                <a:solidFill>
+                  <a:srgbClr val="000000"/>
+                </a:solidFill>
+                <a:miter lim="800000"/>
+                <a:headEnd/>
+                <a:tailEnd/>
+              </a14:hiddenLine>
+            </a:ext>
+          </a:extLst>
+        </p:spPr>
+        <p:txBody>
+          <a:bodyPr wrap="none">
+            <a:spAutoFit/>
+          </a:bodyPr>
+          <a:lstStyle>
+            <a:lvl1pPr eaLnBrk="0" hangingPunct="0">
+              <a:defRPr sz="2400">
+                <a:solidFill>
+                  <a:schemeClr val="tx1"/>
+                </a:solidFill>
+                <a:latin typeface="Arial" charset="0"/>
+                <a:ea typeface="ＭＳ Ｐゴシック" charset="0"/>
+                <a:cs typeface="ＭＳ Ｐゴシック" charset="0"/>
+              </a:defRPr>
+            </a:lvl1pPr>
+            <a:lvl2pPr marL="742950" indent="-285750" eaLnBrk="0" hangingPunct="0">
+              <a:defRPr sz="2400">
+                <a:solidFill>
+                  <a:schemeClr val="tx1"/>
+                </a:solidFill>
+                <a:latin typeface="Arial" charset="0"/>
+                <a:ea typeface="ＭＳ Ｐゴシック" charset="0"/>
+              </a:defRPr>
+            </a:lvl2pPr>
+            <a:lvl3pPr marL="1143000" indent="-228600" eaLnBrk="0" hangingPunct="0">
+              <a:defRPr sz="2400">
+                <a:solidFill>
+                  <a:schemeClr val="tx1"/>
+                </a:solidFill>
+                <a:latin typeface="Arial" charset="0"/>
+                <a:ea typeface="ＭＳ Ｐゴシック" charset="0"/>
+              </a:defRPr>
+            </a:lvl3pPr>
+            <a:lvl4pPr marL="1600200" indent="-228600" eaLnBrk="0" hangingPunct="0">
+              <a:defRPr sz="2400">
+                <a:solidFill>
+                  <a:schemeClr val="tx1"/>
+                </a:solidFill>
+                <a:latin typeface="Arial" charset="0"/>
+                <a:ea typeface="ＭＳ Ｐゴシック" charset="0"/>
+              </a:defRPr>
+            </a:lvl4pPr>
+            <a:lvl5pPr marL="2057400" indent="-228600" eaLnBrk="0" hangingPunct="0">
+              <a:defRPr sz="2400">
+                <a:solidFill>
+                  <a:schemeClr val="tx1"/>
+                </a:solidFill>
+                <a:latin typeface="Arial" charset="0"/>
+                <a:ea typeface="ＭＳ Ｐゴシック" charset="0"/>
+              </a:defRPr>
+            </a:lvl5pPr>
+            <a:lvl6pPr marL="2514600" indent="-228600" eaLnBrk="0" fontAlgn="base" hangingPunct="0">
+              <a:spcBef>
+                <a:spcPct val="0"/>
+              </a:spcBef>
+              <a:spcAft>
+                <a:spcPct val="0"/>
+              </a:spcAft>
+              <a:defRPr sz="2400">
+                <a:solidFill>
+                  <a:schemeClr val="tx1"/>
+                </a:solidFill>
+                <a:latin typeface="Arial" charset="0"/>
+                <a:ea typeface="ＭＳ Ｐゴシック" charset="0"/>
+              </a:defRPr>
+            </a:lvl6pPr>
+            <a:lvl7pPr marL="2971800" indent="-228600" eaLnBrk="0" fontAlgn="base" hangingPunct="0">
+              <a:spcBef>
+                <a:spcPct val="0"/>
+              </a:spcBef>
+              <a:spcAft>
+                <a:spcPct val="0"/>
+              </a:spcAft>
+              <a:defRPr sz="2400">
+                <a:solidFill>
+                  <a:schemeClr val="tx1"/>
+                </a:solidFill>
+                <a:latin typeface="Arial" charset="0"/>
+                <a:ea typeface="ＭＳ Ｐゴシック" charset="0"/>
+              </a:defRPr>
+            </a:lvl7pPr>
+            <a:lvl8pPr marL="3429000" indent="-228600" eaLnBrk="0" fontAlgn="base" hangingPunct="0">
+              <a:spcBef>
+                <a:spcPct val="0"/>
+              </a:spcBef>
+              <a:spcAft>
+                <a:spcPct val="0"/>
+              </a:spcAft>
+              <a:defRPr sz="2400">
+                <a:solidFill>
+                  <a:schemeClr val="tx1"/>
+                </a:solidFill>
+                <a:latin typeface="Arial" charset="0"/>
+                <a:ea typeface="ＭＳ Ｐゴシック" charset="0"/>
+              </a:defRPr>
+            </a:lvl8pPr>
+            <a:lvl9pPr marL="3886200" indent="-228600" eaLnBrk="0" fontAlgn="base" hangingPunct="0">
+              <a:spcBef>
+                <a:spcPct val="0"/>
+              </a:spcBef>
+              <a:spcAft>
+                <a:spcPct val="0"/>
+              </a:spcAft>
+              <a:defRPr sz="2400">
+                <a:solidFill>
+                  <a:schemeClr val="tx1"/>
+                </a:solidFill>
+                <a:latin typeface="Arial" charset="0"/>
+                <a:ea typeface="ＭＳ Ｐゴシック" charset="0"/>
+              </a:defRPr>
+            </a:lvl9pPr>
+          </a:lstStyle>
+          <a:p>
+            <a:pPr eaLnBrk="1" hangingPunct="1"/>
+            <a:r>
+              <a:rPr lang="en-US" sz="1600" b="1" dirty="0"/>
+              <a:t>Module 3</a:t>
+            </a:r>
+          </a:p>
+        </p:txBody>
+      </p:sp>
+      <p:sp>
+        <p:nvSpPr>
+          <p:cNvPr id="6" name="Rounded Rectangle 5"/>
+          <p:cNvSpPr/>
+          <p:nvPr/>
+        </p:nvSpPr>
+        <p:spPr bwMode="auto">
+          <a:xfrm>
+            <a:off x="179388" y="3644900"/>
+            <a:ext cx="4824412" cy="1008063"/>
+          </a:xfrm>
+          <a:prstGeom prst="roundRect">
+            <a:avLst/>
+          </a:prstGeom>
+          <a:gradFill flip="none" rotWithShape="1">
+            <a:gsLst>
+              <a:gs pos="0">
+                <a:schemeClr val="dk1">
+                  <a:tint val="50000"/>
+                  <a:satMod val="300000"/>
+                  <a:alpha val="51000"/>
+                </a:schemeClr>
+              </a:gs>
+              <a:gs pos="35000">
+                <a:schemeClr val="dk1">
+                  <a:tint val="37000"/>
+                  <a:satMod val="300000"/>
+                  <a:alpha val="51000"/>
+                </a:schemeClr>
+              </a:gs>
+              <a:gs pos="100000">
+                <a:schemeClr val="dk1">
+                  <a:tint val="15000"/>
+                  <a:satMod val="350000"/>
+                  <a:alpha val="51000"/>
+                </a:schemeClr>
+              </a:gs>
+            </a:gsLst>
+            <a:lin ang="16200000" scaled="1"/>
+            <a:tileRect/>
+          </a:gradFill>
+        </p:spPr>
+        <p:style>
+          <a:lnRef idx="1">
+            <a:schemeClr val="dk1"/>
+          </a:lnRef>
+          <a:fillRef idx="2">
+            <a:schemeClr val="dk1"/>
+          </a:fillRef>
+          <a:effectRef idx="1">
+            <a:schemeClr val="dk1"/>
+          </a:effectRef>
+          <a:fontRef idx="minor">
+            <a:schemeClr val="dk1"/>
+          </a:fontRef>
+        </p:style>
+        <p:txBody>
+          <a:bodyPr anchor="ctr"/>
+          <a:lstStyle/>
+          <a:p>
+            <a:pPr algn="ctr">
+              <a:defRPr/>
+            </a:pPr>
+            <a:endParaRPr lang="en-US" sz="1200" dirty="0">
+              <a:solidFill>
+                <a:schemeClr val="tx1"/>
+              </a:solidFill>
+            </a:endParaRPr>
+          </a:p>
+        </p:txBody>
+      </p:sp>
+      <p:grpSp>
+        <p:nvGrpSpPr>
+          <p:cNvPr id="7" name="Group 6"/>
+          <p:cNvGrpSpPr>
+            <a:grpSpLocks/>
+          </p:cNvGrpSpPr>
+          <p:nvPr/>
+        </p:nvGrpSpPr>
+        <p:grpSpPr bwMode="auto">
+          <a:xfrm>
+            <a:off x="250825" y="1925638"/>
+            <a:ext cx="1368425" cy="1287462"/>
+            <a:chOff x="251520" y="1926414"/>
+            <a:chExt cx="1368152" cy="1286562"/>
+          </a:xfrm>
+        </p:grpSpPr>
+        <p:sp>
+          <p:nvSpPr>
+            <p:cNvPr id="8" name="Rounded Rectangle 7"/>
+            <p:cNvSpPr/>
+            <p:nvPr/>
+          </p:nvSpPr>
+          <p:spPr>
+            <a:xfrm>
+              <a:off x="251520" y="2492755"/>
+              <a:ext cx="1368152" cy="720221"/>
+            </a:xfrm>
+            <a:prstGeom prst="roundRect">
+              <a:avLst/>
+            </a:prstGeom>
+          </p:spPr>
+          <p:style>
+            <a:lnRef idx="1">
+              <a:schemeClr val="accent3"/>
+            </a:lnRef>
+            <a:fillRef idx="2">
+              <a:schemeClr val="accent3"/>
+            </a:fillRef>
+            <a:effectRef idx="1">
+              <a:schemeClr val="accent3"/>
+            </a:effectRef>
+            <a:fontRef idx="minor">
+              <a:schemeClr val="dk1"/>
+            </a:fontRef>
+          </p:style>
+          <p:txBody>
+            <a:bodyPr anchor="ctr"/>
+            <a:lstStyle/>
+            <a:p>
+              <a:pPr algn="ctr">
+                <a:defRPr/>
+              </a:pPr>
+              <a:r>
+                <a:rPr lang="en-US" sz="1200" dirty="0">
+                  <a:solidFill>
+                    <a:schemeClr val="tx1"/>
+                  </a:solidFill>
+                </a:rPr>
+                <a:t>RNA-</a:t>
+              </a:r>
+              <a:r>
+                <a:rPr lang="en-US" sz="1200" dirty="0" err="1">
+                  <a:solidFill>
+                    <a:schemeClr val="tx1"/>
+                  </a:solidFill>
+                </a:rPr>
+                <a:t>seq</a:t>
+              </a:r>
+              <a:r>
+                <a:rPr lang="en-US" sz="1200" dirty="0">
+                  <a:solidFill>
+                    <a:schemeClr val="tx1"/>
+                  </a:solidFill>
+                </a:rPr>
+                <a:t> reads (2 x 100 </a:t>
+              </a:r>
+              <a:r>
+                <a:rPr lang="en-US" sz="1200" dirty="0" err="1">
+                  <a:solidFill>
+                    <a:schemeClr val="tx1"/>
+                  </a:solidFill>
+                </a:rPr>
+                <a:t>bp</a:t>
+              </a:r>
+              <a:r>
+                <a:rPr lang="en-US" sz="1200" dirty="0">
+                  <a:solidFill>
+                    <a:schemeClr val="tx1"/>
+                  </a:solidFill>
+                </a:rPr>
+                <a:t>)</a:t>
+              </a:r>
+            </a:p>
+          </p:txBody>
+        </p:sp>
+        <p:sp>
+          <p:nvSpPr>
+            <p:cNvPr id="9" name="TextBox 3"/>
+            <p:cNvSpPr txBox="1">
+              <a:spLocks noChangeArrowheads="1"/>
+            </p:cNvSpPr>
+            <p:nvPr/>
+          </p:nvSpPr>
+          <p:spPr bwMode="auto">
+            <a:xfrm>
+              <a:off x="334504" y="1926414"/>
+              <a:ext cx="1202185" cy="307777"/>
+            </a:xfrm>
+            <a:prstGeom prst="rect">
+              <a:avLst/>
+            </a:prstGeom>
+            <a:noFill/>
+            <a:ln>
+              <a:noFill/>
+            </a:ln>
+            <a:extLst>
+              <a:ext uri="{909E8E84-426E-40dd-AFC4-6F175D3DCCD1}">
+                <a14:hiddenFill xmlns:a14="http://schemas.microsoft.com/office/drawing/2010/main" xmlns="">
+                  <a:solidFill>
+                    <a:srgbClr val="FFFFFF"/>
+                  </a:solidFill>
+                </a14:hiddenFill>
+              </a:ext>
+              <a:ext uri="{91240B29-F687-4f45-9708-019B960494DF}">
+                <a14:hiddenLine xmlns:a14="http://schemas.microsoft.com/office/drawing/2010/main" xmlns="" w="9525">
+                  <a:solidFill>
+                    <a:srgbClr val="000000"/>
+                  </a:solidFill>
+                  <a:miter lim="800000"/>
+                  <a:headEnd/>
+                  <a:tailEnd/>
+                </a14:hiddenLine>
+              </a:ext>
+            </a:extLst>
+          </p:spPr>
+          <p:txBody>
+            <a:bodyPr wrap="none">
+              <a:spAutoFit/>
+            </a:bodyPr>
+            <a:lstStyle>
+              <a:lvl1pPr eaLnBrk="0" hangingPunct="0">
+                <a:defRPr sz="2400">
+                  <a:solidFill>
+                    <a:schemeClr val="tx1"/>
+                  </a:solidFill>
+                  <a:latin typeface="Arial" charset="0"/>
+                  <a:ea typeface="ＭＳ Ｐゴシック" charset="0"/>
+                  <a:cs typeface="ＭＳ Ｐゴシック" charset="0"/>
+                </a:defRPr>
+              </a:lvl1pPr>
+              <a:lvl2pPr marL="742950" indent="-285750" eaLnBrk="0" hangingPunct="0">
+                <a:defRPr sz="2400">
+                  <a:solidFill>
+                    <a:schemeClr val="tx1"/>
+                  </a:solidFill>
+                  <a:latin typeface="Arial" charset="0"/>
+                  <a:ea typeface="ＭＳ Ｐゴシック" charset="0"/>
+                </a:defRPr>
+              </a:lvl2pPr>
+              <a:lvl3pPr marL="1143000" indent="-228600" eaLnBrk="0" hangingPunct="0">
+                <a:defRPr sz="2400">
+                  <a:solidFill>
+                    <a:schemeClr val="tx1"/>
+                  </a:solidFill>
+                  <a:latin typeface="Arial" charset="0"/>
+                  <a:ea typeface="ＭＳ Ｐゴシック" charset="0"/>
+                </a:defRPr>
+              </a:lvl3pPr>
+              <a:lvl4pPr marL="1600200" indent="-228600" eaLnBrk="0" hangingPunct="0">
+                <a:defRPr sz="2400">
+                  <a:solidFill>
+                    <a:schemeClr val="tx1"/>
+                  </a:solidFill>
+                  <a:latin typeface="Arial" charset="0"/>
+                  <a:ea typeface="ＭＳ Ｐゴシック" charset="0"/>
+                </a:defRPr>
+              </a:lvl4pPr>
+              <a:lvl5pPr marL="2057400" indent="-228600" eaLnBrk="0" hangingPunct="0">
+                <a:defRPr sz="2400">
+                  <a:solidFill>
+                    <a:schemeClr val="tx1"/>
+                  </a:solidFill>
+                  <a:latin typeface="Arial" charset="0"/>
+                  <a:ea typeface="ＭＳ Ｐゴシック" charset="0"/>
+                </a:defRPr>
+              </a:lvl5pPr>
+              <a:lvl6pPr marL="2514600" indent="-228600" eaLnBrk="0" fontAlgn="base" hangingPunct="0">
+                <a:spcBef>
+                  <a:spcPct val="0"/>
+                </a:spcBef>
+                <a:spcAft>
+                  <a:spcPct val="0"/>
+                </a:spcAft>
+                <a:defRPr sz="2400">
+                  <a:solidFill>
+                    <a:schemeClr val="tx1"/>
+                  </a:solidFill>
+                  <a:latin typeface="Arial" charset="0"/>
+                  <a:ea typeface="ＭＳ Ｐゴシック" charset="0"/>
+                </a:defRPr>
+              </a:lvl6pPr>
+              <a:lvl7pPr marL="2971800" indent="-228600" eaLnBrk="0" fontAlgn="base" hangingPunct="0">
+                <a:spcBef>
+                  <a:spcPct val="0"/>
+                </a:spcBef>
+                <a:spcAft>
+                  <a:spcPct val="0"/>
+                </a:spcAft>
+                <a:defRPr sz="2400">
+                  <a:solidFill>
+                    <a:schemeClr val="tx1"/>
+                  </a:solidFill>
+                  <a:latin typeface="Arial" charset="0"/>
+                  <a:ea typeface="ＭＳ Ｐゴシック" charset="0"/>
+                </a:defRPr>
+              </a:lvl7pPr>
+              <a:lvl8pPr marL="3429000" indent="-228600" eaLnBrk="0" fontAlgn="base" hangingPunct="0">
+                <a:spcBef>
+                  <a:spcPct val="0"/>
+                </a:spcBef>
+                <a:spcAft>
+                  <a:spcPct val="0"/>
+                </a:spcAft>
+                <a:defRPr sz="2400">
+                  <a:solidFill>
+                    <a:schemeClr val="tx1"/>
+                  </a:solidFill>
+                  <a:latin typeface="Arial" charset="0"/>
+                  <a:ea typeface="ＭＳ Ｐゴシック" charset="0"/>
+                </a:defRPr>
+              </a:lvl8pPr>
+              <a:lvl9pPr marL="3886200" indent="-228600" eaLnBrk="0" fontAlgn="base" hangingPunct="0">
+                <a:spcBef>
+                  <a:spcPct val="0"/>
+                </a:spcBef>
+                <a:spcAft>
+                  <a:spcPct val="0"/>
+                </a:spcAft>
+                <a:defRPr sz="2400">
+                  <a:solidFill>
+                    <a:schemeClr val="tx1"/>
+                  </a:solidFill>
+                  <a:latin typeface="Arial" charset="0"/>
+                  <a:ea typeface="ＭＳ Ｐゴシック" charset="0"/>
+                </a:defRPr>
+              </a:lvl9pPr>
+            </a:lstStyle>
+            <a:p>
+              <a:pPr eaLnBrk="1" hangingPunct="1"/>
+              <a:r>
+                <a:rPr lang="en-US" sz="1400" b="1"/>
+                <a:t>Sequencing</a:t>
+              </a:r>
+            </a:p>
+          </p:txBody>
+        </p:sp>
+      </p:grpSp>
+      <p:grpSp>
+        <p:nvGrpSpPr>
+          <p:cNvPr id="10" name="Group 16"/>
+          <p:cNvGrpSpPr>
+            <a:grpSpLocks/>
+          </p:cNvGrpSpPr>
+          <p:nvPr/>
+        </p:nvGrpSpPr>
+        <p:grpSpPr bwMode="auto">
+          <a:xfrm>
+            <a:off x="1916113" y="1819275"/>
+            <a:ext cx="1368425" cy="1393825"/>
+            <a:chOff x="1916196" y="1818692"/>
+            <a:chExt cx="1368152" cy="1394284"/>
+          </a:xfrm>
+        </p:grpSpPr>
+        <p:sp>
+          <p:nvSpPr>
+            <p:cNvPr id="11" name="Rounded Rectangle 10"/>
+            <p:cNvSpPr/>
+            <p:nvPr/>
+          </p:nvSpPr>
+          <p:spPr>
+            <a:xfrm>
+              <a:off x="1916196" y="2493602"/>
+              <a:ext cx="1368152" cy="719374"/>
+            </a:xfrm>
+            <a:prstGeom prst="roundRect">
+              <a:avLst/>
+            </a:prstGeom>
+          </p:spPr>
+          <p:style>
+            <a:lnRef idx="1">
+              <a:schemeClr val="accent4"/>
+            </a:lnRef>
+            <a:fillRef idx="2">
+              <a:schemeClr val="accent4"/>
+            </a:fillRef>
+            <a:effectRef idx="1">
+              <a:schemeClr val="accent4"/>
+            </a:effectRef>
+            <a:fontRef idx="minor">
+              <a:schemeClr val="dk1"/>
+            </a:fontRef>
+          </p:style>
+          <p:txBody>
+            <a:bodyPr anchor="ctr"/>
+            <a:lstStyle/>
+            <a:p>
+              <a:pPr algn="ctr">
+                <a:defRPr/>
+              </a:pPr>
+              <a:r>
+                <a:rPr lang="en-US" sz="1200" dirty="0">
+                  <a:solidFill>
+                    <a:schemeClr val="tx1"/>
+                  </a:solidFill>
+                </a:rPr>
+                <a:t>HISAT2</a:t>
+              </a:r>
+            </a:p>
+          </p:txBody>
+        </p:sp>
+        <p:sp>
+          <p:nvSpPr>
+            <p:cNvPr id="12" name="TextBox 12"/>
+            <p:cNvSpPr txBox="1">
+              <a:spLocks noChangeArrowheads="1"/>
+            </p:cNvSpPr>
+            <p:nvPr/>
+          </p:nvSpPr>
+          <p:spPr bwMode="auto">
+            <a:xfrm>
+              <a:off x="1978694" y="1818692"/>
+              <a:ext cx="1243156" cy="523220"/>
+            </a:xfrm>
+            <a:prstGeom prst="rect">
+              <a:avLst/>
+            </a:prstGeom>
+            <a:noFill/>
+            <a:ln>
+              <a:noFill/>
+            </a:ln>
+            <a:extLst>
+              <a:ext uri="{909E8E84-426E-40dd-AFC4-6F175D3DCCD1}">
+                <a14:hiddenFill xmlns:a14="http://schemas.microsoft.com/office/drawing/2010/main" xmlns="">
+                  <a:solidFill>
+                    <a:srgbClr val="FFFFFF"/>
+                  </a:solidFill>
+                </a14:hiddenFill>
+              </a:ext>
+              <a:ext uri="{91240B29-F687-4f45-9708-019B960494DF}">
+                <a14:hiddenLine xmlns:a14="http://schemas.microsoft.com/office/drawing/2010/main" xmlns="" w="9525">
+                  <a:solidFill>
+                    <a:srgbClr val="000000"/>
+                  </a:solidFill>
+                  <a:miter lim="800000"/>
+                  <a:headEnd/>
+                  <a:tailEnd/>
+                </a14:hiddenLine>
+              </a:ext>
+            </a:extLst>
+          </p:spPr>
+          <p:txBody>
+            <a:bodyPr>
+              <a:spAutoFit/>
+            </a:bodyPr>
+            <a:lstStyle>
+              <a:lvl1pPr eaLnBrk="0" hangingPunct="0">
+                <a:defRPr sz="2400">
+                  <a:solidFill>
+                    <a:schemeClr val="tx1"/>
+                  </a:solidFill>
+                  <a:latin typeface="Arial" charset="0"/>
+                  <a:ea typeface="ＭＳ Ｐゴシック" charset="0"/>
+                  <a:cs typeface="ＭＳ Ｐゴシック" charset="0"/>
+                </a:defRPr>
+              </a:lvl1pPr>
+              <a:lvl2pPr marL="742950" indent="-285750" eaLnBrk="0" hangingPunct="0">
+                <a:defRPr sz="2400">
+                  <a:solidFill>
+                    <a:schemeClr val="tx1"/>
+                  </a:solidFill>
+                  <a:latin typeface="Arial" charset="0"/>
+                  <a:ea typeface="ＭＳ Ｐゴシック" charset="0"/>
+                </a:defRPr>
+              </a:lvl2pPr>
+              <a:lvl3pPr marL="1143000" indent="-228600" eaLnBrk="0" hangingPunct="0">
+                <a:defRPr sz="2400">
+                  <a:solidFill>
+                    <a:schemeClr val="tx1"/>
+                  </a:solidFill>
+                  <a:latin typeface="Arial" charset="0"/>
+                  <a:ea typeface="ＭＳ Ｐゴシック" charset="0"/>
+                </a:defRPr>
+              </a:lvl3pPr>
+              <a:lvl4pPr marL="1600200" indent="-228600" eaLnBrk="0" hangingPunct="0">
+                <a:defRPr sz="2400">
+                  <a:solidFill>
+                    <a:schemeClr val="tx1"/>
+                  </a:solidFill>
+                  <a:latin typeface="Arial" charset="0"/>
+                  <a:ea typeface="ＭＳ Ｐゴシック" charset="0"/>
+                </a:defRPr>
+              </a:lvl4pPr>
+              <a:lvl5pPr marL="2057400" indent="-228600" eaLnBrk="0" hangingPunct="0">
+                <a:defRPr sz="2400">
+                  <a:solidFill>
+                    <a:schemeClr val="tx1"/>
+                  </a:solidFill>
+                  <a:latin typeface="Arial" charset="0"/>
+                  <a:ea typeface="ＭＳ Ｐゴシック" charset="0"/>
+                </a:defRPr>
+              </a:lvl5pPr>
+              <a:lvl6pPr marL="2514600" indent="-228600" eaLnBrk="0" fontAlgn="base" hangingPunct="0">
+                <a:spcBef>
+                  <a:spcPct val="0"/>
+                </a:spcBef>
+                <a:spcAft>
+                  <a:spcPct val="0"/>
+                </a:spcAft>
+                <a:defRPr sz="2400">
+                  <a:solidFill>
+                    <a:schemeClr val="tx1"/>
+                  </a:solidFill>
+                  <a:latin typeface="Arial" charset="0"/>
+                  <a:ea typeface="ＭＳ Ｐゴシック" charset="0"/>
+                </a:defRPr>
+              </a:lvl6pPr>
+              <a:lvl7pPr marL="2971800" indent="-228600" eaLnBrk="0" fontAlgn="base" hangingPunct="0">
+                <a:spcBef>
+                  <a:spcPct val="0"/>
+                </a:spcBef>
+                <a:spcAft>
+                  <a:spcPct val="0"/>
+                </a:spcAft>
+                <a:defRPr sz="2400">
+                  <a:solidFill>
+                    <a:schemeClr val="tx1"/>
+                  </a:solidFill>
+                  <a:latin typeface="Arial" charset="0"/>
+                  <a:ea typeface="ＭＳ Ｐゴシック" charset="0"/>
+                </a:defRPr>
+              </a:lvl7pPr>
+              <a:lvl8pPr marL="3429000" indent="-228600" eaLnBrk="0" fontAlgn="base" hangingPunct="0">
+                <a:spcBef>
+                  <a:spcPct val="0"/>
+                </a:spcBef>
+                <a:spcAft>
+                  <a:spcPct val="0"/>
+                </a:spcAft>
+                <a:defRPr sz="2400">
+                  <a:solidFill>
+                    <a:schemeClr val="tx1"/>
+                  </a:solidFill>
+                  <a:latin typeface="Arial" charset="0"/>
+                  <a:ea typeface="ＭＳ Ｐゴシック" charset="0"/>
+                </a:defRPr>
+              </a:lvl8pPr>
+              <a:lvl9pPr marL="3886200" indent="-228600" eaLnBrk="0" fontAlgn="base" hangingPunct="0">
+                <a:spcBef>
+                  <a:spcPct val="0"/>
+                </a:spcBef>
+                <a:spcAft>
+                  <a:spcPct val="0"/>
+                </a:spcAft>
+                <a:defRPr sz="2400">
+                  <a:solidFill>
+                    <a:schemeClr val="tx1"/>
+                  </a:solidFill>
+                  <a:latin typeface="Arial" charset="0"/>
+                  <a:ea typeface="ＭＳ Ｐゴシック" charset="0"/>
+                </a:defRPr>
+              </a:lvl9pPr>
+            </a:lstStyle>
+            <a:p>
+              <a:pPr algn="ctr" eaLnBrk="1" hangingPunct="1"/>
+              <a:r>
+                <a:rPr lang="en-US" sz="1400" b="1"/>
+                <a:t>Read alignment</a:t>
+              </a:r>
+            </a:p>
+          </p:txBody>
+        </p:sp>
+      </p:grpSp>
+      <p:grpSp>
+        <p:nvGrpSpPr>
+          <p:cNvPr id="13" name="Group 18"/>
+          <p:cNvGrpSpPr>
+            <a:grpSpLocks/>
+          </p:cNvGrpSpPr>
+          <p:nvPr/>
+        </p:nvGrpSpPr>
+        <p:grpSpPr bwMode="auto">
+          <a:xfrm>
+            <a:off x="3419475" y="1819275"/>
+            <a:ext cx="1657350" cy="1393825"/>
+            <a:chOff x="3563889" y="1818692"/>
+            <a:chExt cx="1656184" cy="1394284"/>
+          </a:xfrm>
+        </p:grpSpPr>
+        <p:sp>
+          <p:nvSpPr>
+            <p:cNvPr id="14" name="Rounded Rectangle 13"/>
+            <p:cNvSpPr/>
+            <p:nvPr/>
+          </p:nvSpPr>
+          <p:spPr>
+            <a:xfrm>
+              <a:off x="3708250" y="2493602"/>
+              <a:ext cx="1367462" cy="719374"/>
+            </a:xfrm>
+            <a:prstGeom prst="roundRect">
+              <a:avLst/>
+            </a:prstGeom>
+          </p:spPr>
+          <p:style>
+            <a:lnRef idx="1">
+              <a:schemeClr val="accent1"/>
+            </a:lnRef>
+            <a:fillRef idx="2">
+              <a:schemeClr val="accent1"/>
+            </a:fillRef>
+            <a:effectRef idx="1">
+              <a:schemeClr val="accent1"/>
+            </a:effectRef>
+            <a:fontRef idx="minor">
+              <a:schemeClr val="dk1"/>
+            </a:fontRef>
+          </p:style>
+          <p:txBody>
+            <a:bodyPr anchor="ctr"/>
+            <a:lstStyle/>
+            <a:p>
+              <a:pPr algn="ctr">
+                <a:defRPr/>
+              </a:pPr>
+              <a:r>
+                <a:rPr lang="en-US" sz="1200" dirty="0" err="1">
+                  <a:solidFill>
+                    <a:schemeClr val="tx1"/>
+                  </a:solidFill>
+                </a:rPr>
+                <a:t>htseq</a:t>
+              </a:r>
+              <a:r>
+                <a:rPr lang="en-US" sz="1200" dirty="0">
+                  <a:solidFill>
+                    <a:schemeClr val="tx1"/>
+                  </a:solidFill>
+                </a:rPr>
+                <a:t>-count</a:t>
+              </a:r>
+            </a:p>
+          </p:txBody>
+        </p:sp>
+        <p:sp>
+          <p:nvSpPr>
+            <p:cNvPr id="15" name="TextBox 13"/>
+            <p:cNvSpPr txBox="1">
+              <a:spLocks noChangeArrowheads="1"/>
+            </p:cNvSpPr>
+            <p:nvPr/>
+          </p:nvSpPr>
+          <p:spPr bwMode="auto">
+            <a:xfrm>
+              <a:off x="3563889" y="1818692"/>
+              <a:ext cx="1656184" cy="307878"/>
+            </a:xfrm>
+            <a:prstGeom prst="rect">
+              <a:avLst/>
+            </a:prstGeom>
+            <a:noFill/>
+            <a:ln>
+              <a:noFill/>
+            </a:ln>
+            <a:extLst>
+              <a:ext uri="{909E8E84-426E-40dd-AFC4-6F175D3DCCD1}">
+                <a14:hiddenFill xmlns:a14="http://schemas.microsoft.com/office/drawing/2010/main" xmlns="">
+                  <a:solidFill>
+                    <a:srgbClr val="FFFFFF"/>
+                  </a:solidFill>
+                </a14:hiddenFill>
+              </a:ext>
+              <a:ext uri="{91240B29-F687-4f45-9708-019B960494DF}">
+                <a14:hiddenLine xmlns:a14="http://schemas.microsoft.com/office/drawing/2010/main" xmlns="" w="9525">
+                  <a:solidFill>
+                    <a:srgbClr val="000000"/>
+                  </a:solidFill>
+                  <a:miter lim="800000"/>
+                  <a:headEnd/>
+                  <a:tailEnd/>
+                </a14:hiddenLine>
+              </a:ext>
+            </a:extLst>
+          </p:spPr>
+          <p:txBody>
+            <a:bodyPr>
+              <a:spAutoFit/>
+            </a:bodyPr>
+            <a:lstStyle>
+              <a:lvl1pPr eaLnBrk="0" hangingPunct="0">
+                <a:defRPr sz="2400">
+                  <a:solidFill>
+                    <a:schemeClr val="tx1"/>
+                  </a:solidFill>
+                  <a:latin typeface="Arial" charset="0"/>
+                  <a:ea typeface="ＭＳ Ｐゴシック" charset="0"/>
+                  <a:cs typeface="ＭＳ Ｐゴシック" charset="0"/>
+                </a:defRPr>
+              </a:lvl1pPr>
+              <a:lvl2pPr marL="742950" indent="-285750" eaLnBrk="0" hangingPunct="0">
+                <a:defRPr sz="2400">
+                  <a:solidFill>
+                    <a:schemeClr val="tx1"/>
+                  </a:solidFill>
+                  <a:latin typeface="Arial" charset="0"/>
+                  <a:ea typeface="ＭＳ Ｐゴシック" charset="0"/>
+                </a:defRPr>
+              </a:lvl2pPr>
+              <a:lvl3pPr marL="1143000" indent="-228600" eaLnBrk="0" hangingPunct="0">
+                <a:defRPr sz="2400">
+                  <a:solidFill>
+                    <a:schemeClr val="tx1"/>
+                  </a:solidFill>
+                  <a:latin typeface="Arial" charset="0"/>
+                  <a:ea typeface="ＭＳ Ｐゴシック" charset="0"/>
+                </a:defRPr>
+              </a:lvl3pPr>
+              <a:lvl4pPr marL="1600200" indent="-228600" eaLnBrk="0" hangingPunct="0">
+                <a:defRPr sz="2400">
+                  <a:solidFill>
+                    <a:schemeClr val="tx1"/>
+                  </a:solidFill>
+                  <a:latin typeface="Arial" charset="0"/>
+                  <a:ea typeface="ＭＳ Ｐゴシック" charset="0"/>
+                </a:defRPr>
+              </a:lvl4pPr>
+              <a:lvl5pPr marL="2057400" indent="-228600" eaLnBrk="0" hangingPunct="0">
+                <a:defRPr sz="2400">
+                  <a:solidFill>
+                    <a:schemeClr val="tx1"/>
+                  </a:solidFill>
+                  <a:latin typeface="Arial" charset="0"/>
+                  <a:ea typeface="ＭＳ Ｐゴシック" charset="0"/>
+                </a:defRPr>
+              </a:lvl5pPr>
+              <a:lvl6pPr marL="2514600" indent="-228600" eaLnBrk="0" fontAlgn="base" hangingPunct="0">
+                <a:spcBef>
+                  <a:spcPct val="0"/>
+                </a:spcBef>
+                <a:spcAft>
+                  <a:spcPct val="0"/>
+                </a:spcAft>
+                <a:defRPr sz="2400">
+                  <a:solidFill>
+                    <a:schemeClr val="tx1"/>
+                  </a:solidFill>
+                  <a:latin typeface="Arial" charset="0"/>
+                  <a:ea typeface="ＭＳ Ｐゴシック" charset="0"/>
+                </a:defRPr>
+              </a:lvl6pPr>
+              <a:lvl7pPr marL="2971800" indent="-228600" eaLnBrk="0" fontAlgn="base" hangingPunct="0">
+                <a:spcBef>
+                  <a:spcPct val="0"/>
+                </a:spcBef>
+                <a:spcAft>
+                  <a:spcPct val="0"/>
+                </a:spcAft>
+                <a:defRPr sz="2400">
+                  <a:solidFill>
+                    <a:schemeClr val="tx1"/>
+                  </a:solidFill>
+                  <a:latin typeface="Arial" charset="0"/>
+                  <a:ea typeface="ＭＳ Ｐゴシック" charset="0"/>
+                </a:defRPr>
+              </a:lvl7pPr>
+              <a:lvl8pPr marL="3429000" indent="-228600" eaLnBrk="0" fontAlgn="base" hangingPunct="0">
+                <a:spcBef>
+                  <a:spcPct val="0"/>
+                </a:spcBef>
+                <a:spcAft>
+                  <a:spcPct val="0"/>
+                </a:spcAft>
+                <a:defRPr sz="2400">
+                  <a:solidFill>
+                    <a:schemeClr val="tx1"/>
+                  </a:solidFill>
+                  <a:latin typeface="Arial" charset="0"/>
+                  <a:ea typeface="ＭＳ Ｐゴシック" charset="0"/>
+                </a:defRPr>
+              </a:lvl8pPr>
+              <a:lvl9pPr marL="3886200" indent="-228600" eaLnBrk="0" fontAlgn="base" hangingPunct="0">
+                <a:spcBef>
+                  <a:spcPct val="0"/>
+                </a:spcBef>
+                <a:spcAft>
+                  <a:spcPct val="0"/>
+                </a:spcAft>
+                <a:defRPr sz="2400">
+                  <a:solidFill>
+                    <a:schemeClr val="tx1"/>
+                  </a:solidFill>
+                  <a:latin typeface="Arial" charset="0"/>
+                  <a:ea typeface="ＭＳ Ｐゴシック" charset="0"/>
+                </a:defRPr>
+              </a:lvl9pPr>
+            </a:lstStyle>
+            <a:p>
+              <a:pPr algn="ctr" eaLnBrk="1" hangingPunct="1"/>
+              <a:r>
+                <a:rPr lang="en-US" sz="1400" b="1" dirty="0"/>
+                <a:t>Feature count</a:t>
+              </a:r>
+            </a:p>
+          </p:txBody>
+        </p:sp>
+      </p:grpSp>
+      <p:grpSp>
+        <p:nvGrpSpPr>
+          <p:cNvPr id="16" name="Group 19"/>
+          <p:cNvGrpSpPr>
+            <a:grpSpLocks/>
+          </p:cNvGrpSpPr>
+          <p:nvPr/>
+        </p:nvGrpSpPr>
+        <p:grpSpPr bwMode="auto">
+          <a:xfrm>
+            <a:off x="5076825" y="1819275"/>
+            <a:ext cx="1655763" cy="1393825"/>
+            <a:chOff x="5148064" y="1818692"/>
+            <a:chExt cx="1656184" cy="1394284"/>
+          </a:xfrm>
+        </p:grpSpPr>
+        <p:sp>
+          <p:nvSpPr>
+            <p:cNvPr id="17" name="Rounded Rectangle 16"/>
+            <p:cNvSpPr/>
+            <p:nvPr/>
+          </p:nvSpPr>
+          <p:spPr>
+            <a:xfrm>
+              <a:off x="5292564" y="2493602"/>
+              <a:ext cx="1367185" cy="719374"/>
+            </a:xfrm>
+            <a:prstGeom prst="roundRect">
+              <a:avLst/>
+            </a:prstGeom>
+          </p:spPr>
+          <p:style>
+            <a:lnRef idx="1">
+              <a:schemeClr val="accent1"/>
+            </a:lnRef>
+            <a:fillRef idx="2">
+              <a:schemeClr val="accent1"/>
+            </a:fillRef>
+            <a:effectRef idx="1">
+              <a:schemeClr val="accent1"/>
+            </a:effectRef>
+            <a:fontRef idx="minor">
+              <a:schemeClr val="dk1"/>
+            </a:fontRef>
+          </p:style>
+          <p:txBody>
+            <a:bodyPr anchor="ctr"/>
+            <a:lstStyle/>
+            <a:p>
+              <a:pPr algn="ctr">
+                <a:defRPr/>
+              </a:pPr>
+              <a:r>
+                <a:rPr lang="en-US" sz="1200" dirty="0" err="1">
+                  <a:solidFill>
+                    <a:schemeClr val="tx1"/>
+                  </a:solidFill>
+                </a:rPr>
+                <a:t>htseq</a:t>
+              </a:r>
+              <a:r>
+                <a:rPr lang="en-US" sz="1200" dirty="0">
+                  <a:solidFill>
+                    <a:schemeClr val="tx1"/>
+                  </a:solidFill>
+                </a:rPr>
+                <a:t>-count</a:t>
+              </a:r>
+            </a:p>
+          </p:txBody>
+        </p:sp>
+        <p:sp>
+          <p:nvSpPr>
+            <p:cNvPr id="18" name="TextBox 14"/>
+            <p:cNvSpPr txBox="1">
+              <a:spLocks noChangeArrowheads="1"/>
+            </p:cNvSpPr>
+            <p:nvPr/>
+          </p:nvSpPr>
+          <p:spPr bwMode="auto">
+            <a:xfrm>
+              <a:off x="5148064" y="1818692"/>
+              <a:ext cx="1656184" cy="523392"/>
+            </a:xfrm>
+            <a:prstGeom prst="rect">
+              <a:avLst/>
+            </a:prstGeom>
+            <a:noFill/>
+            <a:ln>
+              <a:noFill/>
+            </a:ln>
+            <a:extLst>
+              <a:ext uri="{909E8E84-426E-40dd-AFC4-6F175D3DCCD1}">
+                <a14:hiddenFill xmlns:a14="http://schemas.microsoft.com/office/drawing/2010/main" xmlns="">
+                  <a:solidFill>
+                    <a:srgbClr val="FFFFFF"/>
+                  </a:solidFill>
+                </a14:hiddenFill>
+              </a:ext>
+              <a:ext uri="{91240B29-F687-4f45-9708-019B960494DF}">
+                <a14:hiddenLine xmlns:a14="http://schemas.microsoft.com/office/drawing/2010/main" xmlns="" w="9525">
+                  <a:solidFill>
+                    <a:srgbClr val="000000"/>
+                  </a:solidFill>
+                  <a:miter lim="800000"/>
+                  <a:headEnd/>
+                  <a:tailEnd/>
+                </a14:hiddenLine>
+              </a:ext>
+            </a:extLst>
+          </p:spPr>
+          <p:txBody>
+            <a:bodyPr>
+              <a:spAutoFit/>
+            </a:bodyPr>
+            <a:lstStyle>
+              <a:lvl1pPr eaLnBrk="0" hangingPunct="0">
+                <a:defRPr sz="2400">
+                  <a:solidFill>
+                    <a:schemeClr val="tx1"/>
+                  </a:solidFill>
+                  <a:latin typeface="Arial" charset="0"/>
+                  <a:ea typeface="ＭＳ Ｐゴシック" charset="0"/>
+                  <a:cs typeface="ＭＳ Ｐゴシック" charset="0"/>
+                </a:defRPr>
+              </a:lvl1pPr>
+              <a:lvl2pPr marL="742950" indent="-285750" eaLnBrk="0" hangingPunct="0">
+                <a:defRPr sz="2400">
+                  <a:solidFill>
+                    <a:schemeClr val="tx1"/>
+                  </a:solidFill>
+                  <a:latin typeface="Arial" charset="0"/>
+                  <a:ea typeface="ＭＳ Ｐゴシック" charset="0"/>
+                </a:defRPr>
+              </a:lvl2pPr>
+              <a:lvl3pPr marL="1143000" indent="-228600" eaLnBrk="0" hangingPunct="0">
+                <a:defRPr sz="2400">
+                  <a:solidFill>
+                    <a:schemeClr val="tx1"/>
+                  </a:solidFill>
+                  <a:latin typeface="Arial" charset="0"/>
+                  <a:ea typeface="ＭＳ Ｐゴシック" charset="0"/>
+                </a:defRPr>
+              </a:lvl3pPr>
+              <a:lvl4pPr marL="1600200" indent="-228600" eaLnBrk="0" hangingPunct="0">
+                <a:defRPr sz="2400">
+                  <a:solidFill>
+                    <a:schemeClr val="tx1"/>
+                  </a:solidFill>
+                  <a:latin typeface="Arial" charset="0"/>
+                  <a:ea typeface="ＭＳ Ｐゴシック" charset="0"/>
+                </a:defRPr>
+              </a:lvl4pPr>
+              <a:lvl5pPr marL="2057400" indent="-228600" eaLnBrk="0" hangingPunct="0">
+                <a:defRPr sz="2400">
+                  <a:solidFill>
+                    <a:schemeClr val="tx1"/>
+                  </a:solidFill>
+                  <a:latin typeface="Arial" charset="0"/>
+                  <a:ea typeface="ＭＳ Ｐゴシック" charset="0"/>
+                </a:defRPr>
+              </a:lvl5pPr>
+              <a:lvl6pPr marL="2514600" indent="-228600" eaLnBrk="0" fontAlgn="base" hangingPunct="0">
+                <a:spcBef>
+                  <a:spcPct val="0"/>
+                </a:spcBef>
+                <a:spcAft>
+                  <a:spcPct val="0"/>
+                </a:spcAft>
+                <a:defRPr sz="2400">
+                  <a:solidFill>
+                    <a:schemeClr val="tx1"/>
+                  </a:solidFill>
+                  <a:latin typeface="Arial" charset="0"/>
+                  <a:ea typeface="ＭＳ Ｐゴシック" charset="0"/>
+                </a:defRPr>
+              </a:lvl6pPr>
+              <a:lvl7pPr marL="2971800" indent="-228600" eaLnBrk="0" fontAlgn="base" hangingPunct="0">
+                <a:spcBef>
+                  <a:spcPct val="0"/>
+                </a:spcBef>
+                <a:spcAft>
+                  <a:spcPct val="0"/>
+                </a:spcAft>
+                <a:defRPr sz="2400">
+                  <a:solidFill>
+                    <a:schemeClr val="tx1"/>
+                  </a:solidFill>
+                  <a:latin typeface="Arial" charset="0"/>
+                  <a:ea typeface="ＭＳ Ｐゴシック" charset="0"/>
+                </a:defRPr>
+              </a:lvl7pPr>
+              <a:lvl8pPr marL="3429000" indent="-228600" eaLnBrk="0" fontAlgn="base" hangingPunct="0">
+                <a:spcBef>
+                  <a:spcPct val="0"/>
+                </a:spcBef>
+                <a:spcAft>
+                  <a:spcPct val="0"/>
+                </a:spcAft>
+                <a:defRPr sz="2400">
+                  <a:solidFill>
+                    <a:schemeClr val="tx1"/>
+                  </a:solidFill>
+                  <a:latin typeface="Arial" charset="0"/>
+                  <a:ea typeface="ＭＳ Ｐゴシック" charset="0"/>
+                </a:defRPr>
+              </a:lvl8pPr>
+              <a:lvl9pPr marL="3886200" indent="-228600" eaLnBrk="0" fontAlgn="base" hangingPunct="0">
+                <a:spcBef>
+                  <a:spcPct val="0"/>
+                </a:spcBef>
+                <a:spcAft>
+                  <a:spcPct val="0"/>
+                </a:spcAft>
+                <a:defRPr sz="2400">
+                  <a:solidFill>
+                    <a:schemeClr val="tx1"/>
+                  </a:solidFill>
+                  <a:latin typeface="Arial" charset="0"/>
+                  <a:ea typeface="ＭＳ Ｐゴシック" charset="0"/>
+                </a:defRPr>
+              </a:lvl9pPr>
+            </a:lstStyle>
+            <a:p>
+              <a:pPr algn="ctr" eaLnBrk="1" hangingPunct="1"/>
+              <a:r>
+                <a:rPr lang="en-US" sz="1400" b="1" dirty="0"/>
+                <a:t>Expression estimation</a:t>
+              </a:r>
+            </a:p>
+          </p:txBody>
+        </p:sp>
+      </p:grpSp>
+      <p:grpSp>
+        <p:nvGrpSpPr>
+          <p:cNvPr id="19" name="Group 20"/>
+          <p:cNvGrpSpPr>
+            <a:grpSpLocks/>
+          </p:cNvGrpSpPr>
+          <p:nvPr/>
+        </p:nvGrpSpPr>
+        <p:grpSpPr bwMode="auto">
+          <a:xfrm>
+            <a:off x="6804025" y="1819275"/>
+            <a:ext cx="1655763" cy="1393825"/>
+            <a:chOff x="6804248" y="1818692"/>
+            <a:chExt cx="1656184" cy="1394284"/>
+          </a:xfrm>
+        </p:grpSpPr>
+        <p:sp>
+          <p:nvSpPr>
+            <p:cNvPr id="20" name="Rounded Rectangle 19"/>
+            <p:cNvSpPr/>
+            <p:nvPr/>
+          </p:nvSpPr>
+          <p:spPr>
+            <a:xfrm>
+              <a:off x="6912225" y="2493602"/>
+              <a:ext cx="1440229" cy="719374"/>
+            </a:xfrm>
+            <a:prstGeom prst="roundRect">
+              <a:avLst/>
+            </a:prstGeom>
+          </p:spPr>
+          <p:style>
+            <a:lnRef idx="1">
+              <a:schemeClr val="accent1"/>
+            </a:lnRef>
+            <a:fillRef idx="2">
+              <a:schemeClr val="accent1"/>
+            </a:fillRef>
+            <a:effectRef idx="1">
+              <a:schemeClr val="accent1"/>
+            </a:effectRef>
+            <a:fontRef idx="minor">
+              <a:schemeClr val="dk1"/>
+            </a:fontRef>
+          </p:style>
+          <p:txBody>
+            <a:bodyPr anchor="ctr"/>
+            <a:lstStyle/>
+            <a:p>
+              <a:pPr algn="ctr">
+                <a:defRPr/>
+              </a:pPr>
+              <a:r>
+                <a:rPr lang="en-US" sz="1200" dirty="0" err="1">
+                  <a:solidFill>
+                    <a:schemeClr val="tx1"/>
+                  </a:solidFill>
+                </a:rPr>
+                <a:t>edgeR</a:t>
+              </a:r>
+              <a:r>
+                <a:rPr lang="en-US" sz="1200" dirty="0">
+                  <a:solidFill>
+                    <a:schemeClr val="tx1"/>
+                  </a:solidFill>
+                </a:rPr>
+                <a:t>/DESeq2</a:t>
+              </a:r>
+            </a:p>
+          </p:txBody>
+        </p:sp>
+        <p:sp>
+          <p:nvSpPr>
+            <p:cNvPr id="21" name="TextBox 15"/>
+            <p:cNvSpPr txBox="1">
+              <a:spLocks noChangeArrowheads="1"/>
+            </p:cNvSpPr>
+            <p:nvPr/>
+          </p:nvSpPr>
+          <p:spPr bwMode="auto">
+            <a:xfrm>
+              <a:off x="6804248" y="1818692"/>
+              <a:ext cx="1656184" cy="523392"/>
+            </a:xfrm>
+            <a:prstGeom prst="rect">
+              <a:avLst/>
+            </a:prstGeom>
+            <a:noFill/>
+            <a:ln>
+              <a:noFill/>
+            </a:ln>
+            <a:extLst>
+              <a:ext uri="{909E8E84-426E-40dd-AFC4-6F175D3DCCD1}">
+                <a14:hiddenFill xmlns:a14="http://schemas.microsoft.com/office/drawing/2010/main" xmlns="">
+                  <a:solidFill>
+                    <a:srgbClr val="FFFFFF"/>
+                  </a:solidFill>
+                </a14:hiddenFill>
+              </a:ext>
+              <a:ext uri="{91240B29-F687-4f45-9708-019B960494DF}">
+                <a14:hiddenLine xmlns:a14="http://schemas.microsoft.com/office/drawing/2010/main" xmlns="" w="9525">
+                  <a:solidFill>
+                    <a:srgbClr val="000000"/>
+                  </a:solidFill>
+                  <a:miter lim="800000"/>
+                  <a:headEnd/>
+                  <a:tailEnd/>
+                </a14:hiddenLine>
+              </a:ext>
+            </a:extLst>
+          </p:spPr>
+          <p:txBody>
+            <a:bodyPr>
+              <a:spAutoFit/>
+            </a:bodyPr>
+            <a:lstStyle>
+              <a:lvl1pPr eaLnBrk="0" hangingPunct="0">
+                <a:defRPr sz="2400">
+                  <a:solidFill>
+                    <a:schemeClr val="tx1"/>
+                  </a:solidFill>
+                  <a:latin typeface="Arial" charset="0"/>
+                  <a:ea typeface="ＭＳ Ｐゴシック" charset="0"/>
+                  <a:cs typeface="ＭＳ Ｐゴシック" charset="0"/>
+                </a:defRPr>
+              </a:lvl1pPr>
+              <a:lvl2pPr marL="742950" indent="-285750" eaLnBrk="0" hangingPunct="0">
+                <a:defRPr sz="2400">
+                  <a:solidFill>
+                    <a:schemeClr val="tx1"/>
+                  </a:solidFill>
+                  <a:latin typeface="Arial" charset="0"/>
+                  <a:ea typeface="ＭＳ Ｐゴシック" charset="0"/>
+                </a:defRPr>
+              </a:lvl2pPr>
+              <a:lvl3pPr marL="1143000" indent="-228600" eaLnBrk="0" hangingPunct="0">
+                <a:defRPr sz="2400">
+                  <a:solidFill>
+                    <a:schemeClr val="tx1"/>
+                  </a:solidFill>
+                  <a:latin typeface="Arial" charset="0"/>
+                  <a:ea typeface="ＭＳ Ｐゴシック" charset="0"/>
+                </a:defRPr>
+              </a:lvl3pPr>
+              <a:lvl4pPr marL="1600200" indent="-228600" eaLnBrk="0" hangingPunct="0">
+                <a:defRPr sz="2400">
+                  <a:solidFill>
+                    <a:schemeClr val="tx1"/>
+                  </a:solidFill>
+                  <a:latin typeface="Arial" charset="0"/>
+                  <a:ea typeface="ＭＳ Ｐゴシック" charset="0"/>
+                </a:defRPr>
+              </a:lvl4pPr>
+              <a:lvl5pPr marL="2057400" indent="-228600" eaLnBrk="0" hangingPunct="0">
+                <a:defRPr sz="2400">
+                  <a:solidFill>
+                    <a:schemeClr val="tx1"/>
+                  </a:solidFill>
+                  <a:latin typeface="Arial" charset="0"/>
+                  <a:ea typeface="ＭＳ Ｐゴシック" charset="0"/>
+                </a:defRPr>
+              </a:lvl5pPr>
+              <a:lvl6pPr marL="2514600" indent="-228600" eaLnBrk="0" fontAlgn="base" hangingPunct="0">
+                <a:spcBef>
+                  <a:spcPct val="0"/>
+                </a:spcBef>
+                <a:spcAft>
+                  <a:spcPct val="0"/>
+                </a:spcAft>
+                <a:defRPr sz="2400">
+                  <a:solidFill>
+                    <a:schemeClr val="tx1"/>
+                  </a:solidFill>
+                  <a:latin typeface="Arial" charset="0"/>
+                  <a:ea typeface="ＭＳ Ｐゴシック" charset="0"/>
+                </a:defRPr>
+              </a:lvl6pPr>
+              <a:lvl7pPr marL="2971800" indent="-228600" eaLnBrk="0" fontAlgn="base" hangingPunct="0">
+                <a:spcBef>
+                  <a:spcPct val="0"/>
+                </a:spcBef>
+                <a:spcAft>
+                  <a:spcPct val="0"/>
+                </a:spcAft>
+                <a:defRPr sz="2400">
+                  <a:solidFill>
+                    <a:schemeClr val="tx1"/>
+                  </a:solidFill>
+                  <a:latin typeface="Arial" charset="0"/>
+                  <a:ea typeface="ＭＳ Ｐゴシック" charset="0"/>
+                </a:defRPr>
+              </a:lvl7pPr>
+              <a:lvl8pPr marL="3429000" indent="-228600" eaLnBrk="0" fontAlgn="base" hangingPunct="0">
+                <a:spcBef>
+                  <a:spcPct val="0"/>
+                </a:spcBef>
+                <a:spcAft>
+                  <a:spcPct val="0"/>
+                </a:spcAft>
+                <a:defRPr sz="2400">
+                  <a:solidFill>
+                    <a:schemeClr val="tx1"/>
+                  </a:solidFill>
+                  <a:latin typeface="Arial" charset="0"/>
+                  <a:ea typeface="ＭＳ Ｐゴシック" charset="0"/>
+                </a:defRPr>
+              </a:lvl8pPr>
+              <a:lvl9pPr marL="3886200" indent="-228600" eaLnBrk="0" fontAlgn="base" hangingPunct="0">
+                <a:spcBef>
+                  <a:spcPct val="0"/>
+                </a:spcBef>
+                <a:spcAft>
+                  <a:spcPct val="0"/>
+                </a:spcAft>
+                <a:defRPr sz="2400">
+                  <a:solidFill>
+                    <a:schemeClr val="tx1"/>
+                  </a:solidFill>
+                  <a:latin typeface="Arial" charset="0"/>
+                  <a:ea typeface="ＭＳ Ｐゴシック" charset="0"/>
+                </a:defRPr>
+              </a:lvl9pPr>
+            </a:lstStyle>
+            <a:p>
+              <a:pPr algn="ctr" eaLnBrk="1" hangingPunct="1"/>
+              <a:r>
+                <a:rPr lang="en-US" sz="1400" b="1"/>
+                <a:t>Differential expression</a:t>
+              </a:r>
+            </a:p>
+          </p:txBody>
+        </p:sp>
+      </p:grpSp>
+      <p:grpSp>
+        <p:nvGrpSpPr>
+          <p:cNvPr id="22" name="Group 21"/>
+          <p:cNvGrpSpPr>
+            <a:grpSpLocks/>
+          </p:cNvGrpSpPr>
+          <p:nvPr/>
+        </p:nvGrpSpPr>
+        <p:grpSpPr bwMode="auto">
+          <a:xfrm>
+            <a:off x="6804025" y="3789363"/>
+            <a:ext cx="1655763" cy="1171575"/>
+            <a:chOff x="6804248" y="3861048"/>
+            <a:chExt cx="1656184" cy="1171873"/>
+          </a:xfrm>
+        </p:grpSpPr>
+        <p:sp>
+          <p:nvSpPr>
+            <p:cNvPr id="23" name="Rounded Rectangle 22"/>
+            <p:cNvSpPr/>
+            <p:nvPr/>
+          </p:nvSpPr>
+          <p:spPr>
+            <a:xfrm>
+              <a:off x="6948748" y="3861048"/>
+              <a:ext cx="1367185" cy="719320"/>
+            </a:xfrm>
+            <a:prstGeom prst="roundRect">
+              <a:avLst/>
+            </a:prstGeom>
+          </p:spPr>
+          <p:style>
+            <a:lnRef idx="1">
+              <a:schemeClr val="accent2"/>
+            </a:lnRef>
+            <a:fillRef idx="2">
+              <a:schemeClr val="accent2"/>
+            </a:fillRef>
+            <a:effectRef idx="1">
+              <a:schemeClr val="accent2"/>
+            </a:effectRef>
+            <a:fontRef idx="minor">
+              <a:schemeClr val="dk1"/>
+            </a:fontRef>
+          </p:style>
+          <p:txBody>
+            <a:bodyPr anchor="ctr"/>
+            <a:lstStyle/>
+            <a:p>
+              <a:pPr algn="ctr">
+                <a:defRPr/>
+              </a:pPr>
+              <a:r>
+                <a:rPr lang="en-US" sz="1200" dirty="0">
+                  <a:solidFill>
+                    <a:schemeClr val="tx1"/>
+                  </a:solidFill>
+                </a:rPr>
+                <a:t>DESeq2/R</a:t>
+              </a:r>
+            </a:p>
+          </p:txBody>
+        </p:sp>
+        <p:sp>
+          <p:nvSpPr>
+            <p:cNvPr id="24" name="TextBox 17"/>
+            <p:cNvSpPr txBox="1">
+              <a:spLocks noChangeArrowheads="1"/>
+            </p:cNvSpPr>
+            <p:nvPr/>
+          </p:nvSpPr>
+          <p:spPr bwMode="auto">
+            <a:xfrm>
+              <a:off x="6804248" y="4725144"/>
+              <a:ext cx="1656184" cy="307777"/>
+            </a:xfrm>
+            <a:prstGeom prst="rect">
+              <a:avLst/>
+            </a:prstGeom>
+            <a:noFill/>
+            <a:ln>
+              <a:noFill/>
+            </a:ln>
+            <a:extLst>
+              <a:ext uri="{909E8E84-426E-40dd-AFC4-6F175D3DCCD1}">
+                <a14:hiddenFill xmlns:a14="http://schemas.microsoft.com/office/drawing/2010/main" xmlns="">
+                  <a:solidFill>
+                    <a:srgbClr val="FFFFFF"/>
+                  </a:solidFill>
+                </a14:hiddenFill>
+              </a:ext>
+              <a:ext uri="{91240B29-F687-4f45-9708-019B960494DF}">
+                <a14:hiddenLine xmlns:a14="http://schemas.microsoft.com/office/drawing/2010/main" xmlns="" w="9525">
+                  <a:solidFill>
+                    <a:srgbClr val="000000"/>
+                  </a:solidFill>
+                  <a:miter lim="800000"/>
+                  <a:headEnd/>
+                  <a:tailEnd/>
+                </a14:hiddenLine>
+              </a:ext>
+            </a:extLst>
+          </p:spPr>
+          <p:txBody>
+            <a:bodyPr>
+              <a:spAutoFit/>
+            </a:bodyPr>
+            <a:lstStyle>
+              <a:lvl1pPr eaLnBrk="0" hangingPunct="0">
+                <a:defRPr sz="2400">
+                  <a:solidFill>
+                    <a:schemeClr val="tx1"/>
+                  </a:solidFill>
+                  <a:latin typeface="Arial" charset="0"/>
+                  <a:ea typeface="ＭＳ Ｐゴシック" charset="0"/>
+                  <a:cs typeface="ＭＳ Ｐゴシック" charset="0"/>
+                </a:defRPr>
+              </a:lvl1pPr>
+              <a:lvl2pPr marL="742950" indent="-285750" eaLnBrk="0" hangingPunct="0">
+                <a:defRPr sz="2400">
+                  <a:solidFill>
+                    <a:schemeClr val="tx1"/>
+                  </a:solidFill>
+                  <a:latin typeface="Arial" charset="0"/>
+                  <a:ea typeface="ＭＳ Ｐゴシック" charset="0"/>
+                </a:defRPr>
+              </a:lvl2pPr>
+              <a:lvl3pPr marL="1143000" indent="-228600" eaLnBrk="0" hangingPunct="0">
+                <a:defRPr sz="2400">
+                  <a:solidFill>
+                    <a:schemeClr val="tx1"/>
+                  </a:solidFill>
+                  <a:latin typeface="Arial" charset="0"/>
+                  <a:ea typeface="ＭＳ Ｐゴシック" charset="0"/>
+                </a:defRPr>
+              </a:lvl3pPr>
+              <a:lvl4pPr marL="1600200" indent="-228600" eaLnBrk="0" hangingPunct="0">
+                <a:defRPr sz="2400">
+                  <a:solidFill>
+                    <a:schemeClr val="tx1"/>
+                  </a:solidFill>
+                  <a:latin typeface="Arial" charset="0"/>
+                  <a:ea typeface="ＭＳ Ｐゴシック" charset="0"/>
+                </a:defRPr>
+              </a:lvl4pPr>
+              <a:lvl5pPr marL="2057400" indent="-228600" eaLnBrk="0" hangingPunct="0">
+                <a:defRPr sz="2400">
+                  <a:solidFill>
+                    <a:schemeClr val="tx1"/>
+                  </a:solidFill>
+                  <a:latin typeface="Arial" charset="0"/>
+                  <a:ea typeface="ＭＳ Ｐゴシック" charset="0"/>
+                </a:defRPr>
+              </a:lvl5pPr>
+              <a:lvl6pPr marL="2514600" indent="-228600" eaLnBrk="0" fontAlgn="base" hangingPunct="0">
+                <a:spcBef>
+                  <a:spcPct val="0"/>
+                </a:spcBef>
+                <a:spcAft>
+                  <a:spcPct val="0"/>
+                </a:spcAft>
+                <a:defRPr sz="2400">
+                  <a:solidFill>
+                    <a:schemeClr val="tx1"/>
+                  </a:solidFill>
+                  <a:latin typeface="Arial" charset="0"/>
+                  <a:ea typeface="ＭＳ Ｐゴシック" charset="0"/>
+                </a:defRPr>
+              </a:lvl6pPr>
+              <a:lvl7pPr marL="2971800" indent="-228600" eaLnBrk="0" fontAlgn="base" hangingPunct="0">
+                <a:spcBef>
+                  <a:spcPct val="0"/>
+                </a:spcBef>
+                <a:spcAft>
+                  <a:spcPct val="0"/>
+                </a:spcAft>
+                <a:defRPr sz="2400">
+                  <a:solidFill>
+                    <a:schemeClr val="tx1"/>
+                  </a:solidFill>
+                  <a:latin typeface="Arial" charset="0"/>
+                  <a:ea typeface="ＭＳ Ｐゴシック" charset="0"/>
+                </a:defRPr>
+              </a:lvl7pPr>
+              <a:lvl8pPr marL="3429000" indent="-228600" eaLnBrk="0" fontAlgn="base" hangingPunct="0">
+                <a:spcBef>
+                  <a:spcPct val="0"/>
+                </a:spcBef>
+                <a:spcAft>
+                  <a:spcPct val="0"/>
+                </a:spcAft>
+                <a:defRPr sz="2400">
+                  <a:solidFill>
+                    <a:schemeClr val="tx1"/>
+                  </a:solidFill>
+                  <a:latin typeface="Arial" charset="0"/>
+                  <a:ea typeface="ＭＳ Ｐゴシック" charset="0"/>
+                </a:defRPr>
+              </a:lvl8pPr>
+              <a:lvl9pPr marL="3886200" indent="-228600" eaLnBrk="0" fontAlgn="base" hangingPunct="0">
+                <a:spcBef>
+                  <a:spcPct val="0"/>
+                </a:spcBef>
+                <a:spcAft>
+                  <a:spcPct val="0"/>
+                </a:spcAft>
+                <a:defRPr sz="2400">
+                  <a:solidFill>
+                    <a:schemeClr val="tx1"/>
+                  </a:solidFill>
+                  <a:latin typeface="Arial" charset="0"/>
+                  <a:ea typeface="ＭＳ Ｐゴシック" charset="0"/>
+                </a:defRPr>
+              </a:lvl9pPr>
+            </a:lstStyle>
+            <a:p>
+              <a:pPr algn="ctr" eaLnBrk="1" hangingPunct="1"/>
+              <a:r>
+                <a:rPr lang="en-US" sz="1400" b="1"/>
+                <a:t>Visualization</a:t>
+              </a:r>
+            </a:p>
+          </p:txBody>
+        </p:sp>
+      </p:grpSp>
+      <p:cxnSp>
+        <p:nvCxnSpPr>
+          <p:cNvPr id="25" name="Straight Arrow Connector 24"/>
+          <p:cNvCxnSpPr>
+            <a:stCxn id="8" idx="3"/>
+            <a:endCxn id="11" idx="1"/>
+          </p:cNvCxnSpPr>
+          <p:nvPr/>
+        </p:nvCxnSpPr>
+        <p:spPr>
+          <a:xfrm>
+            <a:off x="1619250" y="2852738"/>
+            <a:ext cx="296863" cy="0"/>
+          </a:xfrm>
+          <a:prstGeom prst="straightConnector1">
+            <a:avLst/>
+          </a:prstGeom>
+          <a:ln>
+            <a:tailEnd type="arrow"/>
+          </a:ln>
+        </p:spPr>
+        <p:style>
+          <a:lnRef idx="2">
+            <a:schemeClr val="dk1"/>
+          </a:lnRef>
+          <a:fillRef idx="0">
+            <a:schemeClr val="dk1"/>
+          </a:fillRef>
+          <a:effectRef idx="1">
+            <a:schemeClr val="dk1"/>
+          </a:effectRef>
+          <a:fontRef idx="minor">
+            <a:schemeClr val="tx1"/>
+          </a:fontRef>
+        </p:style>
+      </p:cxnSp>
+      <p:cxnSp>
+        <p:nvCxnSpPr>
+          <p:cNvPr id="26" name="Straight Arrow Connector 25"/>
+          <p:cNvCxnSpPr>
+            <a:stCxn id="11" idx="3"/>
+            <a:endCxn id="14" idx="1"/>
+          </p:cNvCxnSpPr>
+          <p:nvPr/>
+        </p:nvCxnSpPr>
+        <p:spPr>
+          <a:xfrm>
+            <a:off x="3284538" y="2852738"/>
+            <a:ext cx="279400" cy="0"/>
+          </a:xfrm>
+          <a:prstGeom prst="straightConnector1">
+            <a:avLst/>
+          </a:prstGeom>
+          <a:ln>
+            <a:tailEnd type="arrow"/>
+          </a:ln>
+        </p:spPr>
+        <p:style>
+          <a:lnRef idx="2">
+            <a:schemeClr val="dk1"/>
+          </a:lnRef>
+          <a:fillRef idx="0">
+            <a:schemeClr val="dk1"/>
+          </a:fillRef>
+          <a:effectRef idx="1">
+            <a:schemeClr val="dk1"/>
+          </a:effectRef>
+          <a:fontRef idx="minor">
+            <a:schemeClr val="tx1"/>
+          </a:fontRef>
+        </p:style>
+      </p:cxnSp>
+      <p:cxnSp>
+        <p:nvCxnSpPr>
+          <p:cNvPr id="27" name="Straight Arrow Connector 26"/>
+          <p:cNvCxnSpPr>
+            <a:stCxn id="14" idx="3"/>
+            <a:endCxn id="17" idx="1"/>
+          </p:cNvCxnSpPr>
+          <p:nvPr/>
+        </p:nvCxnSpPr>
+        <p:spPr>
+          <a:xfrm>
+            <a:off x="4932363" y="2852738"/>
+            <a:ext cx="287337" cy="0"/>
+          </a:xfrm>
+          <a:prstGeom prst="straightConnector1">
+            <a:avLst/>
+          </a:prstGeom>
+          <a:ln>
+            <a:tailEnd type="arrow"/>
+          </a:ln>
+        </p:spPr>
+        <p:style>
+          <a:lnRef idx="2">
+            <a:schemeClr val="dk1"/>
+          </a:lnRef>
+          <a:fillRef idx="0">
+            <a:schemeClr val="dk1"/>
+          </a:fillRef>
+          <a:effectRef idx="1">
+            <a:schemeClr val="dk1"/>
+          </a:effectRef>
+          <a:fontRef idx="minor">
+            <a:schemeClr val="tx1"/>
+          </a:fontRef>
+        </p:style>
+      </p:cxnSp>
+      <p:cxnSp>
+        <p:nvCxnSpPr>
+          <p:cNvPr id="28" name="Straight Arrow Connector 27"/>
+          <p:cNvCxnSpPr>
+            <a:stCxn id="17" idx="3"/>
+            <a:endCxn id="20" idx="1"/>
+          </p:cNvCxnSpPr>
+          <p:nvPr/>
+        </p:nvCxnSpPr>
+        <p:spPr>
+          <a:xfrm>
+            <a:off x="6588125" y="2852738"/>
+            <a:ext cx="323850" cy="0"/>
+          </a:xfrm>
+          <a:prstGeom prst="straightConnector1">
+            <a:avLst/>
+          </a:prstGeom>
+          <a:ln>
+            <a:tailEnd type="arrow"/>
+          </a:ln>
+        </p:spPr>
+        <p:style>
+          <a:lnRef idx="2">
+            <a:schemeClr val="dk1"/>
+          </a:lnRef>
+          <a:fillRef idx="0">
+            <a:schemeClr val="dk1"/>
+          </a:fillRef>
+          <a:effectRef idx="1">
+            <a:schemeClr val="dk1"/>
+          </a:effectRef>
+          <a:fontRef idx="minor">
+            <a:schemeClr val="tx1"/>
+          </a:fontRef>
+        </p:style>
+      </p:cxnSp>
+      <p:cxnSp>
+        <p:nvCxnSpPr>
+          <p:cNvPr id="29" name="Straight Arrow Connector 28"/>
+          <p:cNvCxnSpPr>
+            <a:stCxn id="20" idx="2"/>
+            <a:endCxn id="23" idx="0"/>
+          </p:cNvCxnSpPr>
+          <p:nvPr/>
+        </p:nvCxnSpPr>
+        <p:spPr>
+          <a:xfrm>
+            <a:off x="7632700" y="3213100"/>
+            <a:ext cx="0" cy="576263"/>
+          </a:xfrm>
+          <a:prstGeom prst="straightConnector1">
+            <a:avLst/>
+          </a:prstGeom>
+          <a:ln>
+            <a:tailEnd type="arrow"/>
+          </a:ln>
+        </p:spPr>
+        <p:style>
+          <a:lnRef idx="2">
+            <a:schemeClr val="dk1"/>
+          </a:lnRef>
+          <a:fillRef idx="0">
+            <a:schemeClr val="dk1"/>
+          </a:fillRef>
+          <a:effectRef idx="1">
+            <a:schemeClr val="dk1"/>
+          </a:effectRef>
+          <a:fontRef idx="minor">
+            <a:schemeClr val="tx1"/>
+          </a:fontRef>
+        </p:style>
+      </p:cxnSp>
+      <p:sp>
+        <p:nvSpPr>
+          <p:cNvPr id="30" name="Rounded Rectangle 29"/>
+          <p:cNvSpPr/>
+          <p:nvPr/>
+        </p:nvSpPr>
+        <p:spPr bwMode="auto">
+          <a:xfrm>
+            <a:off x="3563938" y="3789363"/>
+            <a:ext cx="1368425" cy="719137"/>
+          </a:xfrm>
+          <a:prstGeom prst="roundRect">
+            <a:avLst/>
+          </a:prstGeom>
+        </p:spPr>
+        <p:style>
+          <a:lnRef idx="1">
+            <a:schemeClr val="dk1"/>
+          </a:lnRef>
+          <a:fillRef idx="2">
+            <a:schemeClr val="dk1"/>
+          </a:fillRef>
+          <a:effectRef idx="1">
+            <a:schemeClr val="dk1"/>
+          </a:effectRef>
+          <a:fontRef idx="minor">
+            <a:schemeClr val="dk1"/>
+          </a:fontRef>
+        </p:style>
+        <p:txBody>
+          <a:bodyPr anchor="ctr"/>
+          <a:lstStyle/>
+          <a:p>
+            <a:pPr algn="ctr">
+              <a:defRPr/>
+            </a:pPr>
+            <a:r>
+              <a:rPr lang="en-US" sz="1200" dirty="0">
+                <a:solidFill>
+                  <a:schemeClr val="tx1"/>
+                </a:solidFill>
+              </a:rPr>
+              <a:t>Gene annotation </a:t>
+            </a:r>
+          </a:p>
+          <a:p>
+            <a:pPr algn="ctr">
+              <a:defRPr/>
+            </a:pPr>
+            <a:r>
+              <a:rPr lang="en-US" sz="1200" dirty="0">
+                <a:solidFill>
+                  <a:schemeClr val="tx1"/>
+                </a:solidFill>
+              </a:rPr>
+              <a:t>(.</a:t>
+            </a:r>
+            <a:r>
+              <a:rPr lang="en-US" sz="1200" dirty="0" err="1">
+                <a:solidFill>
+                  <a:schemeClr val="tx1"/>
+                </a:solidFill>
+              </a:rPr>
+              <a:t>gtf</a:t>
+            </a:r>
+            <a:r>
+              <a:rPr lang="en-US" sz="1200" dirty="0">
+                <a:solidFill>
+                  <a:schemeClr val="tx1"/>
+                </a:solidFill>
+              </a:rPr>
+              <a:t> file)</a:t>
+            </a:r>
+          </a:p>
+        </p:txBody>
+      </p:sp>
+      <p:sp>
+        <p:nvSpPr>
+          <p:cNvPr id="31" name="Rounded Rectangle 30"/>
+          <p:cNvSpPr/>
+          <p:nvPr/>
+        </p:nvSpPr>
+        <p:spPr bwMode="auto">
+          <a:xfrm>
+            <a:off x="1908175" y="3789363"/>
+            <a:ext cx="1368425" cy="719137"/>
+          </a:xfrm>
+          <a:prstGeom prst="roundRect">
+            <a:avLst/>
+          </a:prstGeom>
+        </p:spPr>
+        <p:style>
+          <a:lnRef idx="1">
+            <a:schemeClr val="dk1"/>
+          </a:lnRef>
+          <a:fillRef idx="2">
+            <a:schemeClr val="dk1"/>
+          </a:fillRef>
+          <a:effectRef idx="1">
+            <a:schemeClr val="dk1"/>
+          </a:effectRef>
+          <a:fontRef idx="minor">
+            <a:schemeClr val="dk1"/>
+          </a:fontRef>
+        </p:style>
+        <p:txBody>
+          <a:bodyPr anchor="ctr"/>
+          <a:lstStyle/>
+          <a:p>
+            <a:pPr algn="ctr">
+              <a:defRPr/>
+            </a:pPr>
+            <a:r>
+              <a:rPr lang="en-US" sz="1200" dirty="0">
+                <a:solidFill>
+                  <a:schemeClr val="tx1"/>
+                </a:solidFill>
+              </a:rPr>
+              <a:t>Reference genome</a:t>
+            </a:r>
+          </a:p>
+          <a:p>
+            <a:pPr algn="ctr">
+              <a:defRPr/>
+            </a:pPr>
+            <a:r>
+              <a:rPr lang="en-US" sz="1200" dirty="0">
+                <a:solidFill>
+                  <a:schemeClr val="tx1"/>
+                </a:solidFill>
+              </a:rPr>
+              <a:t>(.</a:t>
+            </a:r>
+            <a:r>
+              <a:rPr lang="en-US" sz="1200" dirty="0" err="1">
+                <a:solidFill>
+                  <a:schemeClr val="tx1"/>
+                </a:solidFill>
+              </a:rPr>
+              <a:t>fa</a:t>
+            </a:r>
+            <a:r>
+              <a:rPr lang="en-US" sz="1200" dirty="0">
+                <a:solidFill>
+                  <a:schemeClr val="tx1"/>
+                </a:solidFill>
+              </a:rPr>
+              <a:t> file)</a:t>
+            </a:r>
+          </a:p>
+        </p:txBody>
+      </p:sp>
+      <p:sp>
+        <p:nvSpPr>
+          <p:cNvPr id="32" name="Rounded Rectangle 31"/>
+          <p:cNvSpPr/>
+          <p:nvPr/>
+        </p:nvSpPr>
+        <p:spPr bwMode="auto">
+          <a:xfrm>
+            <a:off x="250825" y="3789363"/>
+            <a:ext cx="1368425" cy="719137"/>
+          </a:xfrm>
+          <a:prstGeom prst="roundRect">
+            <a:avLst/>
+          </a:prstGeom>
+        </p:spPr>
+        <p:style>
+          <a:lnRef idx="1">
+            <a:schemeClr val="dk1"/>
+          </a:lnRef>
+          <a:fillRef idx="2">
+            <a:schemeClr val="dk1"/>
+          </a:fillRef>
+          <a:effectRef idx="1">
+            <a:schemeClr val="dk1"/>
+          </a:effectRef>
+          <a:fontRef idx="minor">
+            <a:schemeClr val="dk1"/>
+          </a:fontRef>
+        </p:style>
+        <p:txBody>
+          <a:bodyPr anchor="ctr"/>
+          <a:lstStyle/>
+          <a:p>
+            <a:pPr algn="ctr">
+              <a:defRPr/>
+            </a:pPr>
+            <a:r>
+              <a:rPr lang="en-US" sz="1200" dirty="0">
+                <a:solidFill>
+                  <a:schemeClr val="tx1"/>
+                </a:solidFill>
+              </a:rPr>
+              <a:t>Raw sequence data</a:t>
+            </a:r>
+          </a:p>
+          <a:p>
+            <a:pPr algn="ctr">
+              <a:defRPr/>
+            </a:pPr>
+            <a:r>
+              <a:rPr lang="en-US" sz="1200" dirty="0">
+                <a:solidFill>
+                  <a:schemeClr val="tx1"/>
+                </a:solidFill>
+              </a:rPr>
+              <a:t>(.</a:t>
+            </a:r>
+            <a:r>
+              <a:rPr lang="en-US" sz="1200" dirty="0" err="1">
+                <a:solidFill>
+                  <a:schemeClr val="tx1"/>
+                </a:solidFill>
+              </a:rPr>
+              <a:t>fastq</a:t>
+            </a:r>
+            <a:r>
+              <a:rPr lang="en-US" sz="1200" dirty="0">
+                <a:solidFill>
+                  <a:schemeClr val="tx1"/>
+                </a:solidFill>
+              </a:rPr>
+              <a:t> files)</a:t>
+            </a:r>
+          </a:p>
+        </p:txBody>
+      </p:sp>
+      <p:cxnSp>
+        <p:nvCxnSpPr>
+          <p:cNvPr id="33" name="Straight Arrow Connector 32"/>
+          <p:cNvCxnSpPr>
+            <a:stCxn id="32" idx="0"/>
+            <a:endCxn id="8" idx="2"/>
+          </p:cNvCxnSpPr>
+          <p:nvPr/>
+        </p:nvCxnSpPr>
+        <p:spPr>
+          <a:xfrm flipH="1" flipV="1">
+            <a:off x="935038" y="3213100"/>
+            <a:ext cx="0" cy="576263"/>
+          </a:xfrm>
+          <a:prstGeom prst="straightConnector1">
+            <a:avLst/>
+          </a:prstGeom>
+          <a:ln>
+            <a:tailEnd type="arrow"/>
+          </a:ln>
+        </p:spPr>
+        <p:style>
+          <a:lnRef idx="2">
+            <a:schemeClr val="dk1"/>
+          </a:lnRef>
+          <a:fillRef idx="0">
+            <a:schemeClr val="dk1"/>
+          </a:fillRef>
+          <a:effectRef idx="1">
+            <a:schemeClr val="dk1"/>
+          </a:effectRef>
+          <a:fontRef idx="minor">
+            <a:schemeClr val="tx1"/>
+          </a:fontRef>
+        </p:style>
+      </p:cxnSp>
+      <p:cxnSp>
+        <p:nvCxnSpPr>
+          <p:cNvPr id="34" name="Straight Arrow Connector 33"/>
+          <p:cNvCxnSpPr>
+            <a:stCxn id="31" idx="0"/>
+            <a:endCxn id="11" idx="2"/>
+          </p:cNvCxnSpPr>
+          <p:nvPr/>
+        </p:nvCxnSpPr>
+        <p:spPr>
+          <a:xfrm flipV="1">
+            <a:off x="2592388" y="3213100"/>
+            <a:ext cx="7937" cy="576263"/>
+          </a:xfrm>
+          <a:prstGeom prst="straightConnector1">
+            <a:avLst/>
+          </a:prstGeom>
+          <a:ln>
+            <a:tailEnd type="arrow"/>
+          </a:ln>
+        </p:spPr>
+        <p:style>
+          <a:lnRef idx="2">
+            <a:schemeClr val="dk1"/>
+          </a:lnRef>
+          <a:fillRef idx="0">
+            <a:schemeClr val="dk1"/>
+          </a:fillRef>
+          <a:effectRef idx="1">
+            <a:schemeClr val="dk1"/>
+          </a:effectRef>
+          <a:fontRef idx="minor">
+            <a:schemeClr val="tx1"/>
+          </a:fontRef>
+        </p:style>
+      </p:cxnSp>
+      <p:cxnSp>
+        <p:nvCxnSpPr>
+          <p:cNvPr id="35" name="Straight Arrow Connector 34"/>
+          <p:cNvCxnSpPr>
+            <a:stCxn id="30" idx="0"/>
+            <a:endCxn id="14" idx="2"/>
+          </p:cNvCxnSpPr>
+          <p:nvPr/>
+        </p:nvCxnSpPr>
+        <p:spPr>
+          <a:xfrm flipV="1">
+            <a:off x="4248150" y="3213100"/>
+            <a:ext cx="0" cy="576263"/>
+          </a:xfrm>
+          <a:prstGeom prst="straightConnector1">
+            <a:avLst/>
+          </a:prstGeom>
+          <a:ln>
+            <a:tailEnd type="arrow"/>
+          </a:ln>
+        </p:spPr>
+        <p:style>
+          <a:lnRef idx="2">
+            <a:schemeClr val="dk1"/>
+          </a:lnRef>
+          <a:fillRef idx="0">
+            <a:schemeClr val="dk1"/>
+          </a:fillRef>
+          <a:effectRef idx="1">
+            <a:schemeClr val="dk1"/>
+          </a:effectRef>
+          <a:fontRef idx="minor">
+            <a:schemeClr val="tx1"/>
+          </a:fontRef>
+        </p:style>
+      </p:cxnSp>
+      <p:sp>
+        <p:nvSpPr>
+          <p:cNvPr id="36" name="TextBox 3"/>
+          <p:cNvSpPr txBox="1">
+            <a:spLocks noChangeArrowheads="1"/>
+          </p:cNvSpPr>
+          <p:nvPr/>
+        </p:nvSpPr>
+        <p:spPr bwMode="auto">
+          <a:xfrm>
+            <a:off x="2192338" y="4776788"/>
+            <a:ext cx="723900" cy="307975"/>
+          </a:xfrm>
+          <a:prstGeom prst="rect">
+            <a:avLst/>
+          </a:prstGeom>
+          <a:noFill/>
+          <a:ln>
+            <a:noFill/>
+          </a:ln>
+          <a:extLst>
+            <a:ext uri="{909E8E84-426E-40dd-AFC4-6F175D3DCCD1}">
+              <a14:hiddenFill xmlns:a14="http://schemas.microsoft.com/office/drawing/2010/main" xmlns="">
+                <a:solidFill>
+                  <a:srgbClr val="FFFFFF"/>
+                </a:solidFill>
+              </a14:hiddenFill>
+            </a:ext>
+            <a:ext uri="{91240B29-F687-4f45-9708-019B960494DF}">
+              <a14:hiddenLine xmlns:a14="http://schemas.microsoft.com/office/drawing/2010/main" xmlns="" w="9525">
+                <a:solidFill>
+                  <a:srgbClr val="000000"/>
+                </a:solidFill>
+                <a:miter lim="800000"/>
+                <a:headEnd/>
+                <a:tailEnd/>
+              </a14:hiddenLine>
+            </a:ext>
+          </a:extLst>
+        </p:spPr>
+        <p:txBody>
+          <a:bodyPr wrap="none">
+            <a:spAutoFit/>
+          </a:bodyPr>
+          <a:lstStyle>
+            <a:lvl1pPr eaLnBrk="0" hangingPunct="0">
+              <a:defRPr sz="2400">
+                <a:solidFill>
+                  <a:schemeClr val="tx1"/>
+                </a:solidFill>
+                <a:latin typeface="Arial" charset="0"/>
+                <a:ea typeface="ＭＳ Ｐゴシック" charset="0"/>
+                <a:cs typeface="ＭＳ Ｐゴシック" charset="0"/>
+              </a:defRPr>
+            </a:lvl1pPr>
+            <a:lvl2pPr marL="742950" indent="-285750" eaLnBrk="0" hangingPunct="0">
+              <a:defRPr sz="2400">
+                <a:solidFill>
+                  <a:schemeClr val="tx1"/>
+                </a:solidFill>
+                <a:latin typeface="Arial" charset="0"/>
+                <a:ea typeface="ＭＳ Ｐゴシック" charset="0"/>
+              </a:defRPr>
+            </a:lvl2pPr>
+            <a:lvl3pPr marL="1143000" indent="-228600" eaLnBrk="0" hangingPunct="0">
+              <a:defRPr sz="2400">
+                <a:solidFill>
+                  <a:schemeClr val="tx1"/>
+                </a:solidFill>
+                <a:latin typeface="Arial" charset="0"/>
+                <a:ea typeface="ＭＳ Ｐゴシック" charset="0"/>
+              </a:defRPr>
+            </a:lvl3pPr>
+            <a:lvl4pPr marL="1600200" indent="-228600" eaLnBrk="0" hangingPunct="0">
+              <a:defRPr sz="2400">
+                <a:solidFill>
+                  <a:schemeClr val="tx1"/>
+                </a:solidFill>
+                <a:latin typeface="Arial" charset="0"/>
+                <a:ea typeface="ＭＳ Ｐゴシック" charset="0"/>
+              </a:defRPr>
+            </a:lvl4pPr>
+            <a:lvl5pPr marL="2057400" indent="-228600" eaLnBrk="0" hangingPunct="0">
+              <a:defRPr sz="2400">
+                <a:solidFill>
+                  <a:schemeClr val="tx1"/>
+                </a:solidFill>
+                <a:latin typeface="Arial" charset="0"/>
+                <a:ea typeface="ＭＳ Ｐゴシック" charset="0"/>
+              </a:defRPr>
+            </a:lvl5pPr>
+            <a:lvl6pPr marL="2514600" indent="-228600" eaLnBrk="0" fontAlgn="base" hangingPunct="0">
+              <a:spcBef>
+                <a:spcPct val="0"/>
+              </a:spcBef>
+              <a:spcAft>
+                <a:spcPct val="0"/>
+              </a:spcAft>
+              <a:defRPr sz="2400">
+                <a:solidFill>
+                  <a:schemeClr val="tx1"/>
+                </a:solidFill>
+                <a:latin typeface="Arial" charset="0"/>
+                <a:ea typeface="ＭＳ Ｐゴシック" charset="0"/>
+              </a:defRPr>
+            </a:lvl6pPr>
+            <a:lvl7pPr marL="2971800" indent="-228600" eaLnBrk="0" fontAlgn="base" hangingPunct="0">
+              <a:spcBef>
+                <a:spcPct val="0"/>
+              </a:spcBef>
+              <a:spcAft>
+                <a:spcPct val="0"/>
+              </a:spcAft>
+              <a:defRPr sz="2400">
+                <a:solidFill>
+                  <a:schemeClr val="tx1"/>
+                </a:solidFill>
+                <a:latin typeface="Arial" charset="0"/>
+                <a:ea typeface="ＭＳ Ｐゴシック" charset="0"/>
+              </a:defRPr>
+            </a:lvl7pPr>
+            <a:lvl8pPr marL="3429000" indent="-228600" eaLnBrk="0" fontAlgn="base" hangingPunct="0">
+              <a:spcBef>
+                <a:spcPct val="0"/>
+              </a:spcBef>
+              <a:spcAft>
+                <a:spcPct val="0"/>
+              </a:spcAft>
+              <a:defRPr sz="2400">
+                <a:solidFill>
+                  <a:schemeClr val="tx1"/>
+                </a:solidFill>
+                <a:latin typeface="Arial" charset="0"/>
+                <a:ea typeface="ＭＳ Ｐゴシック" charset="0"/>
+              </a:defRPr>
+            </a:lvl8pPr>
+            <a:lvl9pPr marL="3886200" indent="-228600" eaLnBrk="0" fontAlgn="base" hangingPunct="0">
+              <a:spcBef>
+                <a:spcPct val="0"/>
+              </a:spcBef>
+              <a:spcAft>
+                <a:spcPct val="0"/>
+              </a:spcAft>
+              <a:defRPr sz="2400">
+                <a:solidFill>
+                  <a:schemeClr val="tx1"/>
+                </a:solidFill>
+                <a:latin typeface="Arial" charset="0"/>
+                <a:ea typeface="ＭＳ Ｐゴシック" charset="0"/>
+              </a:defRPr>
+            </a:lvl9pPr>
+          </a:lstStyle>
+          <a:p>
+            <a:pPr eaLnBrk="1" hangingPunct="1"/>
+            <a:r>
+              <a:rPr lang="en-US" sz="1400" b="1"/>
+              <a:t>Inputs</a:t>
+            </a:r>
+          </a:p>
+        </p:txBody>
+      </p:sp>
+    </p:spTree>
+    <p:extLst>
+      <p:ext uri="{BB962C8B-B14F-4D97-AF65-F5344CB8AC3E}">
+        <p14:creationId xmlns:p14="http://schemas.microsoft.com/office/powerpoint/2010/main" val="3271388096"/>
+      </p:ext>
+    </p:extLst>
+  </p:cSld>
+  <p:clrMapOvr>
+    <a:masterClrMapping/>
+  </p:clrMapOvr>
+</p:sld>
+</file>
+
+<file path=ppt/slides/slide6.xml><?xml version="1.0" encoding="utf-8"?>
 <p:sld xmlns:a="http://schemas.openxmlformats.org/drawingml/2006/main" xmlns:r="http://schemas.openxmlformats.org/officeDocument/2006/relationships" xmlns:p="http://schemas.openxmlformats.org/presentationml/2006/main">
   <p:cSld>
     <p:spTree>
@@ -12763,14 +15205,14 @@
           </a:ln>
           <a:extLst>
             <a:ext uri="{909E8E84-426E-40dd-AFC4-6F175D3DCCD1}">
-              <a14:hiddenFill xmlns:a14="http://schemas.microsoft.com/office/drawing/2010/main">
+              <a14:hiddenFill xmlns:a14="http://schemas.microsoft.com/office/drawing/2010/main" xmlns="">
                 <a:solidFill>
                   <a:srgbClr val="FFFFFF"/>
                 </a:solidFill>
               </a14:hiddenFill>
             </a:ext>
             <a:ext uri="{91240B29-F687-4f45-9708-019B960494DF}">
-              <a14:hiddenLine xmlns:a14="http://schemas.microsoft.com/office/drawing/2010/main" w="9525">
+              <a14:hiddenLine xmlns:a14="http://schemas.microsoft.com/office/drawing/2010/main" xmlns="" w="9525">
                 <a:solidFill>
                   <a:srgbClr val="000000"/>
                 </a:solidFill>
@@ -12897,31 +15339,15 @@
             <a:pPr eaLnBrk="1" hangingPunct="1"/>
             <a:r>
               <a:rPr lang="en-US" sz="1600" b="1" dirty="0"/>
-              <a:t>Module </a:t>
+              <a:t>Module 5 – Rerun </a:t>
+            </a:r>
+            <a:r>
+              <a:rPr lang="en-US" sz="1600" b="1" dirty="0" err="1"/>
+              <a:t>StringTie</a:t>
             </a:r>
             <a:r>
               <a:rPr lang="en-US" sz="1600" b="1" dirty="0"/>
-              <a:t>5</a:t>
-            </a:r>
-            <a:r>
-              <a:rPr lang="en-US" sz="1600" b="1" dirty="0" smtClean="0"/>
-              <a:t> </a:t>
-            </a:r>
-            <a:r>
-              <a:rPr lang="en-US" sz="1600" b="1" dirty="0"/>
-              <a:t>– Rerun </a:t>
-            </a:r>
-            <a:r>
-              <a:rPr lang="en-US" sz="1600" b="1" dirty="0" err="1" smtClean="0"/>
-              <a:t>StringTie</a:t>
-            </a:r>
-            <a:r>
-              <a:rPr lang="en-US" sz="1600" b="1" dirty="0" smtClean="0"/>
-              <a:t> </a:t>
-            </a:r>
-            <a:r>
-              <a:rPr lang="en-US" sz="1600" b="1" dirty="0"/>
-              <a:t>in alternative ‘modes’</a:t>
+              <a:t> in alternative ‘modes’</a:t>
             </a:r>
           </a:p>
         </p:txBody>
@@ -13114,14 +15540,14 @@
             </a:ln>
             <a:extLst>
               <a:ext uri="{909E8E84-426E-40dd-AFC4-6F175D3DCCD1}">
-                <a14:hiddenFill xmlns:a14="http://schemas.microsoft.com/office/drawing/2010/main">
+                <a14:hiddenFill xmlns:a14="http://schemas.microsoft.com/office/drawing/2010/main" xmlns="">
                   <a:solidFill>
                     <a:srgbClr val="FFFFFF"/>
                   </a:solidFill>
                 </a14:hiddenFill>
               </a:ext>
               <a:ext uri="{91240B29-F687-4f45-9708-019B960494DF}">
-                <a14:hiddenLine xmlns:a14="http://schemas.microsoft.com/office/drawing/2010/main" w="9525">
+                <a14:hiddenLine xmlns:a14="http://schemas.microsoft.com/office/drawing/2010/main" xmlns="" w="9525">
                   <a:solidFill>
                     <a:srgbClr val="000000"/>
                   </a:solidFill>
@@ -13307,18 +15733,13 @@
                 <a:defRPr/>
               </a:pPr>
               <a:r>
-                <a:rPr lang="en-US" sz="1200" dirty="0" smtClean="0">
+                <a:rPr lang="en-US" sz="1200" dirty="0">
                   <a:solidFill>
                     <a:schemeClr val="tx1"/>
                   </a:solidFill>
                 </a:rPr>
                 <a:t>HISAT2</a:t>
               </a:r>
-              <a:endParaRPr lang="en-US" sz="1200" dirty="0">
-                <a:solidFill>
-                  <a:schemeClr val="tx1"/>
-                </a:solidFill>
-              </a:endParaRPr>
             </a:p>
           </p:txBody>
         </p:sp>
@@ -13344,14 +15765,14 @@
             </a:ln>
             <a:extLst>
               <a:ext uri="{909E8E84-426E-40dd-AFC4-6F175D3DCCD1}">
-                <a14:hiddenFill xmlns:a14="http://schemas.microsoft.com/office/drawing/2010/main">
+                <a14:hiddenFill xmlns:a14="http://schemas.microsoft.com/office/drawing/2010/main" xmlns="">
                   <a:solidFill>
                     <a:srgbClr val="FFFFFF"/>
                   </a:solidFill>
                 </a14:hiddenFill>
               </a:ext>
               <a:ext uri="{91240B29-F687-4f45-9708-019B960494DF}">
-                <a14:hiddenLine xmlns:a14="http://schemas.microsoft.com/office/drawing/2010/main" w="9525">
+                <a14:hiddenLine xmlns:a14="http://schemas.microsoft.com/office/drawing/2010/main" xmlns="" w="9525">
                   <a:solidFill>
                     <a:srgbClr val="000000"/>
                   </a:solidFill>
@@ -13521,7 +15942,7 @@
               <a:defRPr/>
             </a:pPr>
             <a:r>
-              <a:rPr lang="en-US" sz="1200" dirty="0" err="1" smtClean="0">
+              <a:rPr lang="en-US" sz="1200" dirty="0" err="1">
                 <a:solidFill>
                   <a:schemeClr val="tx1"/>
                 </a:solidFill>
@@ -13558,14 +15979,14 @@
           </a:ln>
           <a:extLst>
             <a:ext uri="{909E8E84-426E-40dd-AFC4-6F175D3DCCD1}">
-              <a14:hiddenFill xmlns:a14="http://schemas.microsoft.com/office/drawing/2010/main">
+              <a14:hiddenFill xmlns:a14="http://schemas.microsoft.com/office/drawing/2010/main" xmlns="">
                 <a:solidFill>
                   <a:srgbClr val="FFFFFF"/>
                 </a:solidFill>
               </a14:hiddenFill>
             </a:ext>
             <a:ext uri="{91240B29-F687-4f45-9708-019B960494DF}">
-              <a14:hiddenLine xmlns:a14="http://schemas.microsoft.com/office/drawing/2010/main" w="9525">
+              <a14:hiddenLine xmlns:a14="http://schemas.microsoft.com/office/drawing/2010/main" xmlns="" w="9525">
                 <a:solidFill>
                   <a:srgbClr val="000000"/>
                 </a:solidFill>
@@ -13734,7 +16155,7 @@
               <a:defRPr/>
             </a:pPr>
             <a:r>
-              <a:rPr lang="en-US" sz="1200" dirty="0" err="1" smtClean="0">
+              <a:rPr lang="en-US" sz="1200" dirty="0" err="1">
                 <a:solidFill>
                   <a:schemeClr val="tx1"/>
                 </a:solidFill>
@@ -13771,14 +16192,14 @@
           </a:ln>
           <a:extLst>
             <a:ext uri="{909E8E84-426E-40dd-AFC4-6F175D3DCCD1}">
-              <a14:hiddenFill xmlns:a14="http://schemas.microsoft.com/office/drawing/2010/main">
+              <a14:hiddenFill xmlns:a14="http://schemas.microsoft.com/office/drawing/2010/main" xmlns="">
                 <a:solidFill>
                   <a:srgbClr val="FFFFFF"/>
                 </a:solidFill>
               </a14:hiddenFill>
             </a:ext>
             <a:ext uri="{91240B29-F687-4f45-9708-019B960494DF}">
-              <a14:hiddenLine xmlns:a14="http://schemas.microsoft.com/office/drawing/2010/main" w="9525">
+              <a14:hiddenLine xmlns:a14="http://schemas.microsoft.com/office/drawing/2010/main" xmlns="" w="9525">
                 <a:solidFill>
                   <a:srgbClr val="000000"/>
                 </a:solidFill>
@@ -13904,10 +16325,9 @@
           <a:p>
             <a:pPr algn="ctr" eaLnBrk="1" hangingPunct="1"/>
             <a:r>
-              <a:rPr lang="en-US" sz="1400" b="1" dirty="0" smtClean="0"/>
+              <a:rPr lang="en-US" sz="1400" b="1" dirty="0"/>
               <a:t>Expression estimate</a:t>
             </a:r>
-            <a:endParaRPr lang="en-US" sz="1400" b="1" dirty="0"/>
           </a:p>
         </p:txBody>
       </p:sp>
@@ -13948,7 +16368,7 @@
               <a:defRPr/>
             </a:pPr>
             <a:r>
-              <a:rPr lang="en-US" sz="1200" dirty="0" err="1" smtClean="0">
+              <a:rPr lang="en-US" sz="1200" dirty="0" err="1">
                 <a:solidFill>
                   <a:schemeClr val="tx1"/>
                 </a:solidFill>
@@ -13985,14 +16405,14 @@
           </a:ln>
           <a:extLst>
             <a:ext uri="{909E8E84-426E-40dd-AFC4-6F175D3DCCD1}">
-              <a14:hiddenFill xmlns:a14="http://schemas.microsoft.com/office/drawing/2010/main">
+              <a14:hiddenFill xmlns:a14="http://schemas.microsoft.com/office/drawing/2010/main" xmlns="">
                 <a:solidFill>
                   <a:srgbClr val="FFFFFF"/>
                 </a:solidFill>
               </a14:hiddenFill>
             </a:ext>
             <a:ext uri="{91240B29-F687-4f45-9708-019B960494DF}">
-              <a14:hiddenLine xmlns:a14="http://schemas.microsoft.com/office/drawing/2010/main" w="9525">
+              <a14:hiddenLine xmlns:a14="http://schemas.microsoft.com/office/drawing/2010/main" xmlns="" w="9525">
                 <a:solidFill>
                   <a:srgbClr val="000000"/>
                 </a:solidFill>
@@ -14161,7 +16581,7 @@
               <a:defRPr/>
             </a:pPr>
             <a:r>
-              <a:rPr lang="en-US" sz="1200" dirty="0" err="1" smtClean="0">
+              <a:rPr lang="en-US" sz="1200" dirty="0" err="1">
                 <a:solidFill>
                   <a:schemeClr val="tx1"/>
                 </a:solidFill>
@@ -14169,18 +16589,13 @@
               <a:t>Ballgown</a:t>
             </a:r>
             <a:r>
-              <a:rPr lang="en-US" sz="1200" dirty="0" smtClean="0">
+              <a:rPr lang="en-US" sz="1200" dirty="0">
                 <a:solidFill>
                   <a:schemeClr val="tx1"/>
                 </a:solidFill>
               </a:rPr>
               <a:t> &amp; R</a:t>
             </a:r>
-            <a:endParaRPr lang="en-US" sz="1200" dirty="0">
-              <a:solidFill>
-                <a:schemeClr val="tx1"/>
-              </a:solidFill>
-            </a:endParaRPr>
           </a:p>
         </p:txBody>
       </p:sp>
@@ -14722,14 +17137,14 @@
           </a:ln>
           <a:extLst>
             <a:ext uri="{909E8E84-426E-40dd-AFC4-6F175D3DCCD1}">
-              <a14:hiddenFill xmlns:a14="http://schemas.microsoft.com/office/drawing/2010/main">
+              <a14:hiddenFill xmlns:a14="http://schemas.microsoft.com/office/drawing/2010/main" xmlns="">
                 <a:solidFill>
                   <a:srgbClr val="FFFFFF"/>
                 </a:solidFill>
               </a14:hiddenFill>
             </a:ext>
             <a:ext uri="{91240B29-F687-4f45-9708-019B960494DF}">
-              <a14:hiddenLine xmlns:a14="http://schemas.microsoft.com/office/drawing/2010/main" w="9525">
+              <a14:hiddenLine xmlns:a14="http://schemas.microsoft.com/office/drawing/2010/main" xmlns="" w="9525">
                 <a:solidFill>
                   <a:srgbClr val="000000"/>
                 </a:solidFill>
@@ -14871,13 +17286,6 @@
   <p:clrMapOvr>
     <a:masterClrMapping/>
   </p:clrMapOvr>
-  <p:timing>
-    <p:tnLst>
-      <p:par>
-        <p:cTn xmlns:p14="http://schemas.microsoft.com/office/powerpoint/2010/main" id="1" dur="indefinite" restart="never" nodeType="tmRoot"/>
-      </p:par>
-    </p:tnLst>
-  </p:timing>
 </p:sld>
 </file>
 

</xml_diff>